<commit_message>
Lab-01 and naming conventions
</commit_message>
<xml_diff>
--- a/02-aks-advanced-configuration/slides/Advanced AKS Configuration.pptx
+++ b/02-aks-advanced-configuration/slides/Advanced AKS Configuration.pptx
@@ -5,7 +5,7 @@
     <p:sldMasterId id="2147483648" r:id="rId1"/>
   </p:sldMasterIdLst>
   <p:notesMasterIdLst>
-    <p:notesMasterId r:id="rId10"/>
+    <p:notesMasterId r:id="rId11"/>
   </p:notesMasterIdLst>
   <p:sldIdLst>
     <p:sldId id="256" r:id="rId2"/>
@@ -14,8 +14,9 @@
     <p:sldId id="258" r:id="rId5"/>
     <p:sldId id="260" r:id="rId6"/>
     <p:sldId id="259" r:id="rId7"/>
-    <p:sldId id="320" r:id="rId8"/>
-    <p:sldId id="2076136272" r:id="rId9"/>
+    <p:sldId id="2076136272" r:id="rId8"/>
+    <p:sldId id="2076136273" r:id="rId9"/>
+    <p:sldId id="2076136274" r:id="rId10"/>
   </p:sldIdLst>
   <p:sldSz cx="12192000" cy="6858000"/>
   <p:notesSz cx="6858000" cy="9144000"/>
@@ -204,7 +205,7 @@
           <a:p>
             <a:fld id="{11837477-D453-41A7-B038-AF1F6C7EED11}" type="datetimeFigureOut">
               <a:rPr lang="en-US" smtClean="0"/>
-              <a:t>3/23/2021</a:t>
+              <a:t>3/28/2021</a:t>
             </a:fld>
             <a:endParaRPr lang="en-US"/>
           </a:p>
@@ -1101,7 +1102,7 @@
     </p:spTree>
     <p:extLst>
       <p:ext uri="{BB962C8B-B14F-4D97-AF65-F5344CB8AC3E}">
-        <p14:creationId xmlns:p14="http://schemas.microsoft.com/office/powerpoint/2010/main" val="2669103762"/>
+        <p14:creationId xmlns:p14="http://schemas.microsoft.com/office/powerpoint/2010/main" val="2370068568"/>
       </p:ext>
     </p:extLst>
   </p:cSld>
@@ -1186,7 +1187,92 @@
     </p:spTree>
     <p:extLst>
       <p:ext uri="{BB962C8B-B14F-4D97-AF65-F5344CB8AC3E}">
-        <p14:creationId xmlns:p14="http://schemas.microsoft.com/office/powerpoint/2010/main" val="2370068568"/>
+        <p14:creationId xmlns:p14="http://schemas.microsoft.com/office/powerpoint/2010/main" val="3436207051"/>
+      </p:ext>
+    </p:extLst>
+  </p:cSld>
+  <p:clrMapOvr>
+    <a:masterClrMapping/>
+  </p:clrMapOvr>
+</p:notes>
+</file>
+
+<file path=ppt/notesSlides/notesSlide8.xml><?xml version="1.0" encoding="utf-8"?>
+<p:notes xmlns:a="http://schemas.openxmlformats.org/drawingml/2006/main" xmlns:r="http://schemas.openxmlformats.org/officeDocument/2006/relationships" xmlns:p="http://schemas.openxmlformats.org/presentationml/2006/main">
+  <p:cSld>
+    <p:spTree>
+      <p:nvGrpSpPr>
+        <p:cNvPr id="1" name=""/>
+        <p:cNvGrpSpPr/>
+        <p:nvPr/>
+      </p:nvGrpSpPr>
+      <p:grpSpPr>
+        <a:xfrm>
+          <a:off x="0" y="0"/>
+          <a:ext cx="0" cy="0"/>
+          <a:chOff x="0" y="0"/>
+          <a:chExt cx="0" cy="0"/>
+        </a:xfrm>
+      </p:grpSpPr>
+      <p:sp>
+        <p:nvSpPr>
+          <p:cNvPr id="2" name="Slide Image Placeholder 1"/>
+          <p:cNvSpPr>
+            <a:spLocks noGrp="1" noRot="1" noChangeAspect="1"/>
+          </p:cNvSpPr>
+          <p:nvPr>
+            <p:ph type="sldImg"/>
+          </p:nvPr>
+        </p:nvSpPr>
+        <p:spPr/>
+      </p:sp>
+      <p:sp>
+        <p:nvSpPr>
+          <p:cNvPr id="3" name="Notes Placeholder 2"/>
+          <p:cNvSpPr>
+            <a:spLocks noGrp="1"/>
+          </p:cNvSpPr>
+          <p:nvPr>
+            <p:ph type="body" idx="1"/>
+          </p:nvPr>
+        </p:nvSpPr>
+        <p:spPr/>
+        <p:txBody>
+          <a:bodyPr/>
+          <a:lstStyle/>
+          <a:p>
+            <a:pPr algn="l"/>
+            <a:endParaRPr lang="en-US" dirty="0"/>
+          </a:p>
+        </p:txBody>
+      </p:sp>
+      <p:sp>
+        <p:nvSpPr>
+          <p:cNvPr id="4" name="Slide Number Placeholder 3"/>
+          <p:cNvSpPr>
+            <a:spLocks noGrp="1"/>
+          </p:cNvSpPr>
+          <p:nvPr>
+            <p:ph type="sldNum" sz="quarter" idx="5"/>
+          </p:nvPr>
+        </p:nvSpPr>
+        <p:spPr/>
+        <p:txBody>
+          <a:bodyPr/>
+          <a:lstStyle/>
+          <a:p>
+            <a:fld id="{00A560F4-8102-4EC4-BB24-179BCBD2EB8E}" type="slidenum">
+              <a:rPr lang="en-US" smtClean="0"/>
+              <a:t>9</a:t>
+            </a:fld>
+            <a:endParaRPr lang="en-US"/>
+          </a:p>
+        </p:txBody>
+      </p:sp>
+    </p:spTree>
+    <p:extLst>
+      <p:ext uri="{BB962C8B-B14F-4D97-AF65-F5344CB8AC3E}">
+        <p14:creationId xmlns:p14="http://schemas.microsoft.com/office/powerpoint/2010/main" val="2338693571"/>
       </p:ext>
     </p:extLst>
   </p:cSld>
@@ -1343,7 +1429,7 @@
           <a:p>
             <a:fld id="{CE88D40F-0E01-46E3-A0A3-09B1E418DDBF}" type="datetimeFigureOut">
               <a:rPr lang="en-US" smtClean="0"/>
-              <a:t>3/23/2021</a:t>
+              <a:t>3/28/2021</a:t>
             </a:fld>
             <a:endParaRPr lang="en-US"/>
           </a:p>
@@ -1541,7 +1627,7 @@
           <a:p>
             <a:fld id="{CE88D40F-0E01-46E3-A0A3-09B1E418DDBF}" type="datetimeFigureOut">
               <a:rPr lang="en-US" smtClean="0"/>
-              <a:t>3/23/2021</a:t>
+              <a:t>3/28/2021</a:t>
             </a:fld>
             <a:endParaRPr lang="en-US"/>
           </a:p>
@@ -1749,7 +1835,7 @@
           <a:p>
             <a:fld id="{CE88D40F-0E01-46E3-A0A3-09B1E418DDBF}" type="datetimeFigureOut">
               <a:rPr lang="en-US" smtClean="0"/>
-              <a:t>3/23/2021</a:t>
+              <a:t>3/28/2021</a:t>
             </a:fld>
             <a:endParaRPr lang="en-US"/>
           </a:p>
@@ -2391,7 +2477,7 @@
           <a:p>
             <a:fld id="{CE88D40F-0E01-46E3-A0A3-09B1E418DDBF}" type="datetimeFigureOut">
               <a:rPr lang="en-US" smtClean="0"/>
-              <a:t>3/23/2021</a:t>
+              <a:t>3/28/2021</a:t>
             </a:fld>
             <a:endParaRPr lang="en-US"/>
           </a:p>
@@ -2666,7 +2752,7 @@
           <a:p>
             <a:fld id="{CE88D40F-0E01-46E3-A0A3-09B1E418DDBF}" type="datetimeFigureOut">
               <a:rPr lang="en-US" smtClean="0"/>
-              <a:t>3/23/2021</a:t>
+              <a:t>3/28/2021</a:t>
             </a:fld>
             <a:endParaRPr lang="en-US"/>
           </a:p>
@@ -2931,7 +3017,7 @@
           <a:p>
             <a:fld id="{CE88D40F-0E01-46E3-A0A3-09B1E418DDBF}" type="datetimeFigureOut">
               <a:rPr lang="en-US" smtClean="0"/>
-              <a:t>3/23/2021</a:t>
+              <a:t>3/28/2021</a:t>
             </a:fld>
             <a:endParaRPr lang="en-US"/>
           </a:p>
@@ -3343,7 +3429,7 @@
           <a:p>
             <a:fld id="{CE88D40F-0E01-46E3-A0A3-09B1E418DDBF}" type="datetimeFigureOut">
               <a:rPr lang="en-US" smtClean="0"/>
-              <a:t>3/23/2021</a:t>
+              <a:t>3/28/2021</a:t>
             </a:fld>
             <a:endParaRPr lang="en-US"/>
           </a:p>
@@ -3484,7 +3570,7 @@
           <a:p>
             <a:fld id="{CE88D40F-0E01-46E3-A0A3-09B1E418DDBF}" type="datetimeFigureOut">
               <a:rPr lang="en-US" smtClean="0"/>
-              <a:t>3/23/2021</a:t>
+              <a:t>3/28/2021</a:t>
             </a:fld>
             <a:endParaRPr lang="en-US"/>
           </a:p>
@@ -3597,7 +3683,7 @@
           <a:p>
             <a:fld id="{CE88D40F-0E01-46E3-A0A3-09B1E418DDBF}" type="datetimeFigureOut">
               <a:rPr lang="en-US" smtClean="0"/>
-              <a:t>3/23/2021</a:t>
+              <a:t>3/28/2021</a:t>
             </a:fld>
             <a:endParaRPr lang="en-US"/>
           </a:p>
@@ -3908,7 +3994,7 @@
           <a:p>
             <a:fld id="{CE88D40F-0E01-46E3-A0A3-09B1E418DDBF}" type="datetimeFigureOut">
               <a:rPr lang="en-US" smtClean="0"/>
-              <a:t>3/23/2021</a:t>
+              <a:t>3/28/2021</a:t>
             </a:fld>
             <a:endParaRPr lang="en-US"/>
           </a:p>
@@ -4196,7 +4282,7 @@
           <a:p>
             <a:fld id="{CE88D40F-0E01-46E3-A0A3-09B1E418DDBF}" type="datetimeFigureOut">
               <a:rPr lang="en-US" smtClean="0"/>
-              <a:t>3/23/2021</a:t>
+              <a:t>3/28/2021</a:t>
             </a:fld>
             <a:endParaRPr lang="en-US"/>
           </a:p>
@@ -4437,7 +4523,7 @@
           <a:p>
             <a:fld id="{CE88D40F-0E01-46E3-A0A3-09B1E418DDBF}" type="datetimeFigureOut">
               <a:rPr lang="en-US" smtClean="0"/>
-              <a:t>3/23/2021</a:t>
+              <a:t>3/28/2021</a:t>
             </a:fld>
             <a:endParaRPr lang="en-US"/>
           </a:p>
@@ -7033,26 +7119,13 @@
           <a:p>
             <a:r>
               <a:rPr lang="en-US" dirty="0"/>
-              <a:t>Advanced </a:t>
-            </a:r>
-            <a:r>
-              <a:rPr lang="en-US"/>
-              <a:t>AKS configuration</a:t>
-            </a:r>
-            <a:endParaRPr lang="en-US" dirty="0"/>
+              <a:t>Advanced AKS configuration</a:t>
+            </a:r>
           </a:p>
           <a:p>
             <a:r>
               <a:rPr lang="en-US" dirty="0"/>
-              <a:t>Use </a:t>
-            </a:r>
-            <a:r>
-              <a:rPr lang="en-US" dirty="0" err="1"/>
-              <a:t>Pulumi</a:t>
-            </a:r>
-            <a:r>
-              <a:rPr lang="en-US" dirty="0"/>
-              <a:t> to provision and configuring AKS </a:t>
+              <a:t>Use Pulumi to provision and configuring AKS </a:t>
             </a:r>
             <a:r>
               <a:rPr lang="en-US" dirty="0" err="1"/>
@@ -7942,2757 +8015,6 @@
 </file>
 
 <file path=ppt/slides/slide7.xml><?xml version="1.0" encoding="utf-8"?>
-<p:sld xmlns:a="http://schemas.openxmlformats.org/drawingml/2006/main" xmlns:r="http://schemas.openxmlformats.org/officeDocument/2006/relationships" xmlns:p="http://schemas.openxmlformats.org/presentationml/2006/main">
-  <p:cSld>
-    <p:spTree>
-      <p:nvGrpSpPr>
-        <p:cNvPr id="1" name=""/>
-        <p:cNvGrpSpPr/>
-        <p:nvPr/>
-      </p:nvGrpSpPr>
-      <p:grpSpPr>
-        <a:xfrm>
-          <a:off x="0" y="0"/>
-          <a:ext cx="0" cy="0"/>
-          <a:chOff x="0" y="0"/>
-          <a:chExt cx="0" cy="0"/>
-        </a:xfrm>
-      </p:grpSpPr>
-      <p:sp>
-        <p:nvSpPr>
-          <p:cNvPr id="2" name="Title 1">
-            <a:extLst>
-              <a:ext uri="{FF2B5EF4-FFF2-40B4-BE49-F238E27FC236}">
-                <a16:creationId xmlns:a16="http://schemas.microsoft.com/office/drawing/2014/main" id="{AF708F16-5DBC-4B6A-8DFC-6213EECAA9C2}"/>
-              </a:ext>
-            </a:extLst>
-          </p:cNvPr>
-          <p:cNvSpPr>
-            <a:spLocks noGrp="1"/>
-          </p:cNvSpPr>
-          <p:nvPr>
-            <p:ph type="title"/>
-          </p:nvPr>
-        </p:nvSpPr>
-        <p:spPr/>
-        <p:txBody>
-          <a:bodyPr/>
-          <a:lstStyle/>
-          <a:p>
-            <a:r>
-              <a:rPr lang="en-US" dirty="0"/>
-              <a:t>Infrastructure</a:t>
-            </a:r>
-          </a:p>
-        </p:txBody>
-      </p:sp>
-      <p:pic>
-        <p:nvPicPr>
-          <p:cNvPr id="4" name="Google Shape;56;p13">
-            <a:extLst>
-              <a:ext uri="{FF2B5EF4-FFF2-40B4-BE49-F238E27FC236}">
-                <a16:creationId xmlns:a16="http://schemas.microsoft.com/office/drawing/2014/main" id="{5DC2FED0-7C5F-460C-998D-2520FD324176}"/>
-              </a:ext>
-            </a:extLst>
-          </p:cNvPr>
-          <p:cNvPicPr preferRelativeResize="0"/>
-          <p:nvPr/>
-        </p:nvPicPr>
-        <p:blipFill>
-          <a:blip r:embed="rId3">
-            <a:alphaModFix/>
-          </a:blip>
-          <a:stretch>
-            <a:fillRect/>
-          </a:stretch>
-        </p:blipFill>
-        <p:spPr>
-          <a:xfrm>
-            <a:off x="10989179" y="5736492"/>
-            <a:ext cx="1202821" cy="1121508"/>
-          </a:xfrm>
-          <a:prstGeom prst="rect">
-            <a:avLst/>
-          </a:prstGeom>
-          <a:noFill/>
-          <a:ln>
-            <a:noFill/>
-          </a:ln>
-        </p:spPr>
-      </p:pic>
-      <p:pic>
-        <p:nvPicPr>
-          <p:cNvPr id="6" name="Picture 5">
-            <a:extLst>
-              <a:ext uri="{FF2B5EF4-FFF2-40B4-BE49-F238E27FC236}">
-                <a16:creationId xmlns:a16="http://schemas.microsoft.com/office/drawing/2014/main" id="{562789FC-24E6-41E1-B839-308F71066FC1}"/>
-              </a:ext>
-            </a:extLst>
-          </p:cNvPr>
-          <p:cNvPicPr>
-            <a:picLocks noChangeAspect="1"/>
-          </p:cNvPicPr>
-          <p:nvPr/>
-        </p:nvPicPr>
-        <p:blipFill>
-          <a:blip r:embed="rId4"/>
-          <a:stretch>
-            <a:fillRect/>
-          </a:stretch>
-        </p:blipFill>
-        <p:spPr>
-          <a:xfrm>
-            <a:off x="10765535" y="469734"/>
-            <a:ext cx="1010865" cy="1010865"/>
-          </a:xfrm>
-          <a:prstGeom prst="rect">
-            <a:avLst/>
-          </a:prstGeom>
-        </p:spPr>
-      </p:pic>
-      <p:pic>
-        <p:nvPicPr>
-          <p:cNvPr id="9" name="Graphic 8">
-            <a:extLst>
-              <a:ext uri="{FF2B5EF4-FFF2-40B4-BE49-F238E27FC236}">
-                <a16:creationId xmlns:a16="http://schemas.microsoft.com/office/drawing/2014/main" id="{92DE313B-900C-40F8-B44F-500D6420AD0C}"/>
-              </a:ext>
-            </a:extLst>
-          </p:cNvPr>
-          <p:cNvPicPr>
-            <a:picLocks noChangeAspect="1"/>
-          </p:cNvPicPr>
-          <p:nvPr/>
-        </p:nvPicPr>
-        <p:blipFill>
-          <a:blip r:embed="rId5">
-            <a:extLst>
-              <a:ext uri="{28A0092B-C50C-407E-A947-70E740481C1C}">
-                <a14:useLocalDpi xmlns:a14="http://schemas.microsoft.com/office/drawing/2010/main" val="0"/>
-              </a:ext>
-              <a:ext uri="{96DAC541-7B7A-43D3-8B79-37D633B846F1}">
-                <asvg:svgBlip xmlns:asvg="http://schemas.microsoft.com/office/drawing/2016/SVG/main" r:embed="rId6"/>
-              </a:ext>
-            </a:extLst>
-          </a:blip>
-          <a:stretch>
-            <a:fillRect/>
-          </a:stretch>
-        </p:blipFill>
-        <p:spPr>
-          <a:xfrm>
-            <a:off x="2911258" y="3799667"/>
-            <a:ext cx="393217" cy="393217"/>
-          </a:xfrm>
-          <a:prstGeom prst="rect">
-            <a:avLst/>
-          </a:prstGeom>
-        </p:spPr>
-      </p:pic>
-      <p:grpSp>
-        <p:nvGrpSpPr>
-          <p:cNvPr id="49" name="Group 48">
-            <a:extLst>
-              <a:ext uri="{FF2B5EF4-FFF2-40B4-BE49-F238E27FC236}">
-                <a16:creationId xmlns:a16="http://schemas.microsoft.com/office/drawing/2014/main" id="{7750D624-94D9-4CA0-B825-123BD9CF770E}"/>
-              </a:ext>
-            </a:extLst>
-          </p:cNvPr>
-          <p:cNvGrpSpPr/>
-          <p:nvPr/>
-        </p:nvGrpSpPr>
-        <p:grpSpPr>
-          <a:xfrm>
-            <a:off x="3388687" y="4726564"/>
-            <a:ext cx="697627" cy="827116"/>
-            <a:chOff x="3550948" y="3920375"/>
-            <a:chExt cx="697627" cy="827116"/>
-          </a:xfrm>
-        </p:grpSpPr>
-        <p:pic>
-          <p:nvPicPr>
-            <p:cNvPr id="7" name="Graphic 6">
-              <a:extLst>
-                <a:ext uri="{FF2B5EF4-FFF2-40B4-BE49-F238E27FC236}">
-                  <a16:creationId xmlns:a16="http://schemas.microsoft.com/office/drawing/2014/main" id="{52E93C3C-1655-40EE-A865-841A44028CD4}"/>
-                </a:ext>
-              </a:extLst>
-            </p:cNvPr>
-            <p:cNvPicPr>
-              <a:picLocks noChangeAspect="1"/>
-            </p:cNvPicPr>
-            <p:nvPr/>
-          </p:nvPicPr>
-          <p:blipFill>
-            <a:blip r:embed="rId7">
-              <a:extLst>
-                <a:ext uri="{28A0092B-C50C-407E-A947-70E740481C1C}">
-                  <a14:useLocalDpi xmlns:a14="http://schemas.microsoft.com/office/drawing/2010/main" val="0"/>
-                </a:ext>
-                <a:ext uri="{96DAC541-7B7A-43D3-8B79-37D633B846F1}">
-                  <asvg:svgBlip xmlns:asvg="http://schemas.microsoft.com/office/drawing/2016/SVG/main" r:embed="rId8"/>
-                </a:ext>
-              </a:extLst>
-            </a:blip>
-            <a:stretch>
-              <a:fillRect/>
-            </a:stretch>
-          </p:blipFill>
-          <p:spPr>
-            <a:xfrm>
-              <a:off x="3667554" y="3920375"/>
-              <a:ext cx="464416" cy="464416"/>
-            </a:xfrm>
-            <a:prstGeom prst="rect">
-              <a:avLst/>
-            </a:prstGeom>
-          </p:spPr>
-        </p:pic>
-        <p:sp>
-          <p:nvSpPr>
-            <p:cNvPr id="46" name="TextBox 45">
-              <a:extLst>
-                <a:ext uri="{FF2B5EF4-FFF2-40B4-BE49-F238E27FC236}">
-                  <a16:creationId xmlns:a16="http://schemas.microsoft.com/office/drawing/2014/main" id="{45AB030F-9807-484D-86BC-3A9EAC420485}"/>
-                </a:ext>
-              </a:extLst>
-            </p:cNvPr>
-            <p:cNvSpPr txBox="1"/>
-            <p:nvPr/>
-          </p:nvSpPr>
-          <p:spPr>
-            <a:xfrm>
-              <a:off x="3550948" y="4347381"/>
-              <a:ext cx="697627" cy="400110"/>
-            </a:xfrm>
-            <a:prstGeom prst="rect">
-              <a:avLst/>
-            </a:prstGeom>
-            <a:noFill/>
-          </p:spPr>
-          <p:txBody>
-            <a:bodyPr wrap="none" rtlCol="0">
-              <a:spAutoFit/>
-            </a:bodyPr>
-            <a:lstStyle/>
-            <a:p>
-              <a:pPr algn="ctr"/>
-              <a:r>
-                <a:rPr lang="en-US" sz="1000" dirty="0"/>
-                <a:t>System </a:t>
-              </a:r>
-            </a:p>
-            <a:p>
-              <a:pPr algn="ctr"/>
-              <a:r>
-                <a:rPr lang="en-US" sz="1000" dirty="0"/>
-                <a:t>Nodepool</a:t>
-              </a:r>
-            </a:p>
-          </p:txBody>
-        </p:sp>
-      </p:grpSp>
-      <p:grpSp>
-        <p:nvGrpSpPr>
-          <p:cNvPr id="48" name="Group 47">
-            <a:extLst>
-              <a:ext uri="{FF2B5EF4-FFF2-40B4-BE49-F238E27FC236}">
-                <a16:creationId xmlns:a16="http://schemas.microsoft.com/office/drawing/2014/main" id="{A058822C-E0AF-4FB9-8049-F047CB30558B}"/>
-              </a:ext>
-            </a:extLst>
-          </p:cNvPr>
-          <p:cNvGrpSpPr/>
-          <p:nvPr/>
-        </p:nvGrpSpPr>
-        <p:grpSpPr>
-          <a:xfrm>
-            <a:off x="5315093" y="4710521"/>
-            <a:ext cx="721672" cy="839412"/>
-            <a:chOff x="4962626" y="3920375"/>
-            <a:chExt cx="721672" cy="839412"/>
-          </a:xfrm>
-        </p:grpSpPr>
-        <p:pic>
-          <p:nvPicPr>
-            <p:cNvPr id="42" name="Graphic 41">
-              <a:extLst>
-                <a:ext uri="{FF2B5EF4-FFF2-40B4-BE49-F238E27FC236}">
-                  <a16:creationId xmlns:a16="http://schemas.microsoft.com/office/drawing/2014/main" id="{7C876E2A-10D7-4B53-969B-22F8D0302E35}"/>
-                </a:ext>
-              </a:extLst>
-            </p:cNvPr>
-            <p:cNvPicPr>
-              <a:picLocks noChangeAspect="1"/>
-            </p:cNvPicPr>
-            <p:nvPr/>
-          </p:nvPicPr>
-          <p:blipFill>
-            <a:blip r:embed="rId7">
-              <a:extLst>
-                <a:ext uri="{28A0092B-C50C-407E-A947-70E740481C1C}">
-                  <a14:useLocalDpi xmlns:a14="http://schemas.microsoft.com/office/drawing/2010/main" val="0"/>
-                </a:ext>
-                <a:ext uri="{96DAC541-7B7A-43D3-8B79-37D633B846F1}">
-                  <asvg:svgBlip xmlns:asvg="http://schemas.microsoft.com/office/drawing/2016/SVG/main" r:embed="rId8"/>
-                </a:ext>
-              </a:extLst>
-            </a:blip>
-            <a:stretch>
-              <a:fillRect/>
-            </a:stretch>
-          </p:blipFill>
-          <p:spPr>
-            <a:xfrm>
-              <a:off x="5091254" y="3920375"/>
-              <a:ext cx="464416" cy="464416"/>
-            </a:xfrm>
-            <a:prstGeom prst="rect">
-              <a:avLst/>
-            </a:prstGeom>
-          </p:spPr>
-        </p:pic>
-        <p:sp>
-          <p:nvSpPr>
-            <p:cNvPr id="47" name="TextBox 46">
-              <a:extLst>
-                <a:ext uri="{FF2B5EF4-FFF2-40B4-BE49-F238E27FC236}">
-                  <a16:creationId xmlns:a16="http://schemas.microsoft.com/office/drawing/2014/main" id="{A2000AB8-0FED-4BED-ADD1-AD89070BCD2A}"/>
-                </a:ext>
-              </a:extLst>
-            </p:cNvPr>
-            <p:cNvSpPr txBox="1"/>
-            <p:nvPr/>
-          </p:nvSpPr>
-          <p:spPr>
-            <a:xfrm>
-              <a:off x="4962626" y="4359677"/>
-              <a:ext cx="721672" cy="400110"/>
-            </a:xfrm>
-            <a:prstGeom prst="rect">
-              <a:avLst/>
-            </a:prstGeom>
-            <a:noFill/>
-          </p:spPr>
-          <p:txBody>
-            <a:bodyPr wrap="none" rtlCol="0">
-              <a:spAutoFit/>
-            </a:bodyPr>
-            <a:lstStyle/>
-            <a:p>
-              <a:pPr algn="ctr"/>
-              <a:r>
-                <a:rPr lang="en-US" sz="1000" dirty="0"/>
-                <a:t>Workload </a:t>
-              </a:r>
-            </a:p>
-            <a:p>
-              <a:pPr algn="ctr"/>
-              <a:r>
-                <a:rPr lang="en-US" sz="1000" dirty="0"/>
-                <a:t>Nodepool</a:t>
-              </a:r>
-            </a:p>
-          </p:txBody>
-        </p:sp>
-      </p:grpSp>
-      <p:grpSp>
-        <p:nvGrpSpPr>
-          <p:cNvPr id="51" name="Group 50">
-            <a:extLst>
-              <a:ext uri="{FF2B5EF4-FFF2-40B4-BE49-F238E27FC236}">
-                <a16:creationId xmlns:a16="http://schemas.microsoft.com/office/drawing/2014/main" id="{379A2A45-1ECA-4E01-8990-9365FF2D6180}"/>
-              </a:ext>
-            </a:extLst>
-          </p:cNvPr>
-          <p:cNvGrpSpPr/>
-          <p:nvPr/>
-        </p:nvGrpSpPr>
-        <p:grpSpPr>
-          <a:xfrm>
-            <a:off x="4284453" y="3970487"/>
-            <a:ext cx="1484578" cy="464415"/>
-            <a:chOff x="4350799" y="3212180"/>
-            <a:chExt cx="1484578" cy="464415"/>
-          </a:xfrm>
-        </p:grpSpPr>
-        <p:pic>
-          <p:nvPicPr>
-            <p:cNvPr id="15" name="Graphic 14">
-              <a:extLst>
-                <a:ext uri="{FF2B5EF4-FFF2-40B4-BE49-F238E27FC236}">
-                  <a16:creationId xmlns:a16="http://schemas.microsoft.com/office/drawing/2014/main" id="{2A6792FA-DB64-4DC7-8DB4-F840BDB2F40D}"/>
-                </a:ext>
-              </a:extLst>
-            </p:cNvPr>
-            <p:cNvPicPr>
-              <a:picLocks noChangeAspect="1"/>
-            </p:cNvPicPr>
-            <p:nvPr/>
-          </p:nvPicPr>
-          <p:blipFill>
-            <a:blip r:embed="rId9">
-              <a:extLst>
-                <a:ext uri="{28A0092B-C50C-407E-A947-70E740481C1C}">
-                  <a14:useLocalDpi xmlns:a14="http://schemas.microsoft.com/office/drawing/2010/main" val="0"/>
-                </a:ext>
-                <a:ext uri="{96DAC541-7B7A-43D3-8B79-37D633B846F1}">
-                  <asvg:svgBlip xmlns:asvg="http://schemas.microsoft.com/office/drawing/2016/SVG/main" r:embed="rId10"/>
-                </a:ext>
-              </a:extLst>
-            </a:blip>
-            <a:stretch>
-              <a:fillRect/>
-            </a:stretch>
-          </p:blipFill>
-          <p:spPr>
-            <a:xfrm>
-              <a:off x="4350799" y="3212180"/>
-              <a:ext cx="464415" cy="464415"/>
-            </a:xfrm>
-            <a:prstGeom prst="rect">
-              <a:avLst/>
-            </a:prstGeom>
-          </p:spPr>
-        </p:pic>
-        <p:sp>
-          <p:nvSpPr>
-            <p:cNvPr id="50" name="TextBox 49">
-              <a:extLst>
-                <a:ext uri="{FF2B5EF4-FFF2-40B4-BE49-F238E27FC236}">
-                  <a16:creationId xmlns:a16="http://schemas.microsoft.com/office/drawing/2014/main" id="{3E4294BE-6E31-468E-A20A-6907EA24EE52}"/>
-                </a:ext>
-              </a:extLst>
-            </p:cNvPr>
-            <p:cNvSpPr txBox="1"/>
-            <p:nvPr/>
-          </p:nvSpPr>
-          <p:spPr>
-            <a:xfrm>
-              <a:off x="4746328" y="3244332"/>
-              <a:ext cx="1089049" cy="400110"/>
-            </a:xfrm>
-            <a:prstGeom prst="rect">
-              <a:avLst/>
-            </a:prstGeom>
-            <a:noFill/>
-          </p:spPr>
-          <p:txBody>
-            <a:bodyPr wrap="square" rtlCol="0">
-              <a:spAutoFit/>
-            </a:bodyPr>
-            <a:lstStyle/>
-            <a:p>
-              <a:r>
-                <a:rPr lang="en-US" sz="1000" dirty="0"/>
-                <a:t>Nginx Ingress</a:t>
-              </a:r>
-            </a:p>
-            <a:p>
-              <a:r>
-                <a:rPr lang="en-US" sz="1000" dirty="0"/>
-                <a:t>controller (SLB)</a:t>
-              </a:r>
-            </a:p>
-          </p:txBody>
-        </p:sp>
-      </p:grpSp>
-      <p:cxnSp>
-        <p:nvCxnSpPr>
-          <p:cNvPr id="53" name="Connector: Elbow 52">
-            <a:extLst>
-              <a:ext uri="{FF2B5EF4-FFF2-40B4-BE49-F238E27FC236}">
-                <a16:creationId xmlns:a16="http://schemas.microsoft.com/office/drawing/2014/main" id="{5E8C712E-08EF-4C7D-843F-29C88554DDC4}"/>
-              </a:ext>
-            </a:extLst>
-          </p:cNvPr>
-          <p:cNvCxnSpPr>
-            <a:stCxn id="15" idx="2"/>
-            <a:endCxn id="7" idx="0"/>
-          </p:cNvCxnSpPr>
-          <p:nvPr/>
-        </p:nvCxnSpPr>
-        <p:spPr>
-          <a:xfrm rot="5400000">
-            <a:off x="3981250" y="4191153"/>
-            <a:ext cx="291662" cy="779160"/>
-          </a:xfrm>
-          <a:prstGeom prst="bentConnector3">
-            <a:avLst/>
-          </a:prstGeom>
-          <a:ln>
-            <a:tailEnd type="triangle"/>
-          </a:ln>
-        </p:spPr>
-        <p:style>
-          <a:lnRef idx="1">
-            <a:schemeClr val="accent1"/>
-          </a:lnRef>
-          <a:fillRef idx="0">
-            <a:schemeClr val="accent1"/>
-          </a:fillRef>
-          <a:effectRef idx="0">
-            <a:schemeClr val="accent1"/>
-          </a:effectRef>
-          <a:fontRef idx="minor">
-            <a:schemeClr val="tx1"/>
-          </a:fontRef>
-        </p:style>
-      </p:cxnSp>
-      <p:cxnSp>
-        <p:nvCxnSpPr>
-          <p:cNvPr id="60" name="Connector: Elbow 59">
-            <a:extLst>
-              <a:ext uri="{FF2B5EF4-FFF2-40B4-BE49-F238E27FC236}">
-                <a16:creationId xmlns:a16="http://schemas.microsoft.com/office/drawing/2014/main" id="{3F0AA1B5-51EB-4D0C-9CD2-6C421A793121}"/>
-              </a:ext>
-            </a:extLst>
-          </p:cNvPr>
-          <p:cNvCxnSpPr>
-            <a:cxnSpLocks/>
-            <a:endCxn id="42" idx="0"/>
-          </p:cNvCxnSpPr>
-          <p:nvPr/>
-        </p:nvCxnSpPr>
-        <p:spPr>
-          <a:xfrm>
-            <a:off x="4516200" y="4591767"/>
-            <a:ext cx="1159729" cy="118754"/>
-          </a:xfrm>
-          <a:prstGeom prst="bentConnector2">
-            <a:avLst/>
-          </a:prstGeom>
-          <a:ln>
-            <a:tailEnd type="triangle"/>
-          </a:ln>
-        </p:spPr>
-        <p:style>
-          <a:lnRef idx="1">
-            <a:schemeClr val="accent1"/>
-          </a:lnRef>
-          <a:fillRef idx="0">
-            <a:schemeClr val="accent1"/>
-          </a:fillRef>
-          <a:effectRef idx="0">
-            <a:schemeClr val="accent1"/>
-          </a:effectRef>
-          <a:fontRef idx="minor">
-            <a:schemeClr val="tx1"/>
-          </a:fontRef>
-        </p:style>
-      </p:cxnSp>
-      <p:cxnSp>
-        <p:nvCxnSpPr>
-          <p:cNvPr id="63" name="Connector: Elbow 62">
-            <a:extLst>
-              <a:ext uri="{FF2B5EF4-FFF2-40B4-BE49-F238E27FC236}">
-                <a16:creationId xmlns:a16="http://schemas.microsoft.com/office/drawing/2014/main" id="{E4722500-60F2-496B-A0C8-BEFC7471E8FE}"/>
-              </a:ext>
-            </a:extLst>
-          </p:cNvPr>
-          <p:cNvCxnSpPr>
-            <a:stCxn id="12" idx="2"/>
-            <a:endCxn id="15" idx="0"/>
-          </p:cNvCxnSpPr>
-          <p:nvPr/>
-        </p:nvCxnSpPr>
-        <p:spPr>
-          <a:xfrm rot="16200000" flipH="1">
-            <a:off x="4154114" y="3607939"/>
-            <a:ext cx="725093" cy="1"/>
-          </a:xfrm>
-          <a:prstGeom prst="bentConnector3">
-            <a:avLst/>
-          </a:prstGeom>
-          <a:ln>
-            <a:tailEnd type="triangle"/>
-          </a:ln>
-        </p:spPr>
-        <p:style>
-          <a:lnRef idx="1">
-            <a:schemeClr val="accent1"/>
-          </a:lnRef>
-          <a:fillRef idx="0">
-            <a:schemeClr val="accent1"/>
-          </a:fillRef>
-          <a:effectRef idx="0">
-            <a:schemeClr val="accent1"/>
-          </a:effectRef>
-          <a:fontRef idx="minor">
-            <a:schemeClr val="tx1"/>
-          </a:fontRef>
-        </p:style>
-      </p:cxnSp>
-      <p:cxnSp>
-        <p:nvCxnSpPr>
-          <p:cNvPr id="70" name="Connector: Elbow 69">
-            <a:extLst>
-              <a:ext uri="{FF2B5EF4-FFF2-40B4-BE49-F238E27FC236}">
-                <a16:creationId xmlns:a16="http://schemas.microsoft.com/office/drawing/2014/main" id="{EA7C3777-2174-432B-9EE3-92D0D6A8EBDE}"/>
-              </a:ext>
-            </a:extLst>
-          </p:cNvPr>
-          <p:cNvCxnSpPr>
-            <a:stCxn id="23" idx="2"/>
-            <a:endCxn id="12" idx="0"/>
-          </p:cNvCxnSpPr>
-          <p:nvPr/>
-        </p:nvCxnSpPr>
-        <p:spPr>
-          <a:xfrm rot="16200000" flipH="1">
-            <a:off x="4331984" y="2596302"/>
-            <a:ext cx="368893" cy="459"/>
-          </a:xfrm>
-          <a:prstGeom prst="bentConnector3">
-            <a:avLst/>
-          </a:prstGeom>
-          <a:ln>
-            <a:tailEnd type="triangle"/>
-          </a:ln>
-        </p:spPr>
-        <p:style>
-          <a:lnRef idx="1">
-            <a:schemeClr val="accent1"/>
-          </a:lnRef>
-          <a:fillRef idx="0">
-            <a:schemeClr val="accent1"/>
-          </a:fillRef>
-          <a:effectRef idx="0">
-            <a:schemeClr val="accent1"/>
-          </a:effectRef>
-          <a:fontRef idx="minor">
-            <a:schemeClr val="tx1"/>
-          </a:fontRef>
-        </p:style>
-      </p:cxnSp>
-      <p:sp>
-        <p:nvSpPr>
-          <p:cNvPr id="72" name="Rectangle 71">
-            <a:extLst>
-              <a:ext uri="{FF2B5EF4-FFF2-40B4-BE49-F238E27FC236}">
-                <a16:creationId xmlns:a16="http://schemas.microsoft.com/office/drawing/2014/main" id="{1145F759-F8D6-4D5C-A35D-FF3BD13F3B91}"/>
-              </a:ext>
-            </a:extLst>
-          </p:cNvPr>
-          <p:cNvSpPr/>
-          <p:nvPr/>
-        </p:nvSpPr>
-        <p:spPr>
-          <a:xfrm>
-            <a:off x="2842953" y="3746482"/>
-            <a:ext cx="3599411" cy="1906285"/>
-          </a:xfrm>
-          <a:prstGeom prst="rect">
-            <a:avLst/>
-          </a:prstGeom>
-          <a:noFill/>
-          <a:ln>
-            <a:prstDash val="lgDash"/>
-          </a:ln>
-        </p:spPr>
-        <p:style>
-          <a:lnRef idx="2">
-            <a:schemeClr val="accent1">
-              <a:shade val="50000"/>
-            </a:schemeClr>
-          </a:lnRef>
-          <a:fillRef idx="1">
-            <a:schemeClr val="accent1"/>
-          </a:fillRef>
-          <a:effectRef idx="0">
-            <a:schemeClr val="accent1"/>
-          </a:effectRef>
-          <a:fontRef idx="minor">
-            <a:schemeClr val="lt1"/>
-          </a:fontRef>
-        </p:style>
-        <p:txBody>
-          <a:bodyPr rtlCol="0" anchor="ctr"/>
-          <a:lstStyle/>
-          <a:p>
-            <a:pPr algn="ctr"/>
-            <a:endParaRPr lang="en-US"/>
-          </a:p>
-        </p:txBody>
-      </p:sp>
-      <p:sp>
-        <p:nvSpPr>
-          <p:cNvPr id="73" name="Rectangle 72">
-            <a:extLst>
-              <a:ext uri="{FF2B5EF4-FFF2-40B4-BE49-F238E27FC236}">
-                <a16:creationId xmlns:a16="http://schemas.microsoft.com/office/drawing/2014/main" id="{8DABFB2F-B120-48F5-BF4B-8339C821B6D7}"/>
-              </a:ext>
-            </a:extLst>
-          </p:cNvPr>
-          <p:cNvSpPr/>
-          <p:nvPr/>
-        </p:nvSpPr>
-        <p:spPr>
-          <a:xfrm>
-            <a:off x="2842953" y="2557336"/>
-            <a:ext cx="3599411" cy="688056"/>
-          </a:xfrm>
-          <a:prstGeom prst="rect">
-            <a:avLst/>
-          </a:prstGeom>
-          <a:noFill/>
-          <a:ln>
-            <a:prstDash val="lgDash"/>
-          </a:ln>
-        </p:spPr>
-        <p:style>
-          <a:lnRef idx="2">
-            <a:schemeClr val="accent1">
-              <a:shade val="50000"/>
-            </a:schemeClr>
-          </a:lnRef>
-          <a:fillRef idx="1">
-            <a:schemeClr val="accent1"/>
-          </a:fillRef>
-          <a:effectRef idx="0">
-            <a:schemeClr val="accent1"/>
-          </a:effectRef>
-          <a:fontRef idx="minor">
-            <a:schemeClr val="lt1"/>
-          </a:fontRef>
-        </p:style>
-        <p:txBody>
-          <a:bodyPr rtlCol="0" anchor="ctr"/>
-          <a:lstStyle/>
-          <a:p>
-            <a:pPr algn="ctr"/>
-            <a:endParaRPr lang="en-US"/>
-          </a:p>
-        </p:txBody>
-      </p:sp>
-      <p:sp>
-        <p:nvSpPr>
-          <p:cNvPr id="74" name="Rectangle 73">
-            <a:extLst>
-              <a:ext uri="{FF2B5EF4-FFF2-40B4-BE49-F238E27FC236}">
-                <a16:creationId xmlns:a16="http://schemas.microsoft.com/office/drawing/2014/main" id="{8A045277-52EE-41B8-8DA2-EEF67B4EB82A}"/>
-              </a:ext>
-            </a:extLst>
-          </p:cNvPr>
-          <p:cNvSpPr/>
-          <p:nvPr/>
-        </p:nvSpPr>
-        <p:spPr>
-          <a:xfrm>
-            <a:off x="2842952" y="1785717"/>
-            <a:ext cx="3599411" cy="688056"/>
-          </a:xfrm>
-          <a:prstGeom prst="rect">
-            <a:avLst/>
-          </a:prstGeom>
-          <a:noFill/>
-          <a:ln>
-            <a:prstDash val="lgDash"/>
-          </a:ln>
-        </p:spPr>
-        <p:style>
-          <a:lnRef idx="2">
-            <a:schemeClr val="accent1">
-              <a:shade val="50000"/>
-            </a:schemeClr>
-          </a:lnRef>
-          <a:fillRef idx="1">
-            <a:schemeClr val="accent1"/>
-          </a:fillRef>
-          <a:effectRef idx="0">
-            <a:schemeClr val="accent1"/>
-          </a:effectRef>
-          <a:fontRef idx="minor">
-            <a:schemeClr val="lt1"/>
-          </a:fontRef>
-        </p:style>
-        <p:txBody>
-          <a:bodyPr rtlCol="0" anchor="ctr"/>
-          <a:lstStyle/>
-          <a:p>
-            <a:pPr algn="ctr"/>
-            <a:endParaRPr lang="en-US"/>
-          </a:p>
-        </p:txBody>
-      </p:sp>
-      <p:cxnSp>
-        <p:nvCxnSpPr>
-          <p:cNvPr id="76" name="Connector: Elbow 75">
-            <a:extLst>
-              <a:ext uri="{FF2B5EF4-FFF2-40B4-BE49-F238E27FC236}">
-                <a16:creationId xmlns:a16="http://schemas.microsoft.com/office/drawing/2014/main" id="{D62F31E2-0B40-450C-8BA2-00527D57E164}"/>
-              </a:ext>
-            </a:extLst>
-          </p:cNvPr>
-          <p:cNvCxnSpPr>
-            <a:cxnSpLocks/>
-            <a:stCxn id="100" idx="1"/>
-            <a:endCxn id="103" idx="3"/>
-          </p:cNvCxnSpPr>
-          <p:nvPr/>
-        </p:nvCxnSpPr>
-        <p:spPr>
-          <a:xfrm rot="10800000" flipV="1">
-            <a:off x="4719098" y="1307509"/>
-            <a:ext cx="826999" cy="2919"/>
-          </a:xfrm>
-          <a:prstGeom prst="bentConnector3">
-            <a:avLst>
-              <a:gd name="adj1" fmla="val 50000"/>
-            </a:avLst>
-          </a:prstGeom>
-          <a:ln>
-            <a:tailEnd type="triangle"/>
-          </a:ln>
-        </p:spPr>
-        <p:style>
-          <a:lnRef idx="1">
-            <a:schemeClr val="accent1"/>
-          </a:lnRef>
-          <a:fillRef idx="0">
-            <a:schemeClr val="accent1"/>
-          </a:fillRef>
-          <a:effectRef idx="0">
-            <a:schemeClr val="accent1"/>
-          </a:effectRef>
-          <a:fontRef idx="minor">
-            <a:schemeClr val="tx1"/>
-          </a:fontRef>
-        </p:style>
-      </p:cxnSp>
-      <p:sp>
-        <p:nvSpPr>
-          <p:cNvPr id="77" name="TextBox 76">
-            <a:extLst>
-              <a:ext uri="{FF2B5EF4-FFF2-40B4-BE49-F238E27FC236}">
-                <a16:creationId xmlns:a16="http://schemas.microsoft.com/office/drawing/2014/main" id="{F928DDEF-CDB0-47AB-9EBE-4A255645836D}"/>
-              </a:ext>
-            </a:extLst>
-          </p:cNvPr>
-          <p:cNvSpPr txBox="1"/>
-          <p:nvPr/>
-        </p:nvSpPr>
-        <p:spPr>
-          <a:xfrm>
-            <a:off x="5572142" y="2269333"/>
-            <a:ext cx="967106" cy="246221"/>
-          </a:xfrm>
-          <a:prstGeom prst="rect">
-            <a:avLst/>
-          </a:prstGeom>
-          <a:noFill/>
-        </p:spPr>
-        <p:txBody>
-          <a:bodyPr wrap="square" rtlCol="0">
-            <a:spAutoFit/>
-          </a:bodyPr>
-          <a:lstStyle/>
-          <a:p>
-            <a:pPr algn="r"/>
-            <a:r>
-              <a:rPr lang="en-US" sz="1000" dirty="0"/>
-              <a:t>AGW subnet</a:t>
-            </a:r>
-          </a:p>
-        </p:txBody>
-      </p:sp>
-      <p:sp>
-        <p:nvSpPr>
-          <p:cNvPr id="78" name="TextBox 77">
-            <a:extLst>
-              <a:ext uri="{FF2B5EF4-FFF2-40B4-BE49-F238E27FC236}">
-                <a16:creationId xmlns:a16="http://schemas.microsoft.com/office/drawing/2014/main" id="{8660CB76-795A-4458-94C1-09B5E8CF4DA8}"/>
-              </a:ext>
-            </a:extLst>
-          </p:cNvPr>
-          <p:cNvSpPr txBox="1"/>
-          <p:nvPr/>
-        </p:nvSpPr>
-        <p:spPr>
-          <a:xfrm>
-            <a:off x="5526957" y="3047490"/>
-            <a:ext cx="967106" cy="246221"/>
-          </a:xfrm>
-          <a:prstGeom prst="rect">
-            <a:avLst/>
-          </a:prstGeom>
-          <a:noFill/>
-        </p:spPr>
-        <p:txBody>
-          <a:bodyPr wrap="square" rtlCol="0">
-            <a:spAutoFit/>
-          </a:bodyPr>
-          <a:lstStyle/>
-          <a:p>
-            <a:pPr algn="r"/>
-            <a:r>
-              <a:rPr lang="en-US" sz="1000" dirty="0"/>
-              <a:t>APIM subnet</a:t>
-            </a:r>
-          </a:p>
-        </p:txBody>
-      </p:sp>
-      <p:sp>
-        <p:nvSpPr>
-          <p:cNvPr id="79" name="TextBox 78">
-            <a:extLst>
-              <a:ext uri="{FF2B5EF4-FFF2-40B4-BE49-F238E27FC236}">
-                <a16:creationId xmlns:a16="http://schemas.microsoft.com/office/drawing/2014/main" id="{E4A4BB18-6F49-4F94-9A73-D439AF5BC5E4}"/>
-              </a:ext>
-            </a:extLst>
-          </p:cNvPr>
-          <p:cNvSpPr txBox="1"/>
-          <p:nvPr/>
-        </p:nvSpPr>
-        <p:spPr>
-          <a:xfrm>
-            <a:off x="2783571" y="5453147"/>
-            <a:ext cx="967106" cy="246221"/>
-          </a:xfrm>
-          <a:prstGeom prst="rect">
-            <a:avLst/>
-          </a:prstGeom>
-          <a:noFill/>
-        </p:spPr>
-        <p:txBody>
-          <a:bodyPr wrap="square" rtlCol="0">
-            <a:spAutoFit/>
-          </a:bodyPr>
-          <a:lstStyle/>
-          <a:p>
-            <a:r>
-              <a:rPr lang="en-US" sz="1000" dirty="0"/>
-              <a:t>AKS subnet</a:t>
-            </a:r>
-          </a:p>
-        </p:txBody>
-      </p:sp>
-      <p:sp>
-        <p:nvSpPr>
-          <p:cNvPr id="80" name="Rectangle 79">
-            <a:extLst>
-              <a:ext uri="{FF2B5EF4-FFF2-40B4-BE49-F238E27FC236}">
-                <a16:creationId xmlns:a16="http://schemas.microsoft.com/office/drawing/2014/main" id="{06D06C80-61AD-40AD-A254-90E26D89F9F3}"/>
-              </a:ext>
-            </a:extLst>
-          </p:cNvPr>
-          <p:cNvSpPr/>
-          <p:nvPr/>
-        </p:nvSpPr>
-        <p:spPr>
-          <a:xfrm>
-            <a:off x="2664069" y="3676558"/>
-            <a:ext cx="3930695" cy="2249922"/>
-          </a:xfrm>
-          <a:prstGeom prst="rect">
-            <a:avLst/>
-          </a:prstGeom>
-          <a:noFill/>
-          <a:ln>
-            <a:prstDash val="lgDash"/>
-          </a:ln>
-        </p:spPr>
-        <p:style>
-          <a:lnRef idx="2">
-            <a:schemeClr val="accent1">
-              <a:shade val="50000"/>
-            </a:schemeClr>
-          </a:lnRef>
-          <a:fillRef idx="1">
-            <a:schemeClr val="accent1"/>
-          </a:fillRef>
-          <a:effectRef idx="0">
-            <a:schemeClr val="accent1"/>
-          </a:effectRef>
-          <a:fontRef idx="minor">
-            <a:schemeClr val="lt1"/>
-          </a:fontRef>
-        </p:style>
-        <p:txBody>
-          <a:bodyPr rtlCol="0" anchor="ctr"/>
-          <a:lstStyle/>
-          <a:p>
-            <a:pPr algn="ctr"/>
-            <a:endParaRPr lang="en-US"/>
-          </a:p>
-        </p:txBody>
-      </p:sp>
-      <p:pic>
-        <p:nvPicPr>
-          <p:cNvPr id="82" name="Graphic 81">
-            <a:extLst>
-              <a:ext uri="{FF2B5EF4-FFF2-40B4-BE49-F238E27FC236}">
-                <a16:creationId xmlns:a16="http://schemas.microsoft.com/office/drawing/2014/main" id="{711CAAFD-17C2-4C96-9613-FEB58B352AB3}"/>
-              </a:ext>
-            </a:extLst>
-          </p:cNvPr>
-          <p:cNvPicPr>
-            <a:picLocks noChangeAspect="1"/>
-          </p:cNvPicPr>
-          <p:nvPr/>
-        </p:nvPicPr>
-        <p:blipFill>
-          <a:blip r:embed="rId11">
-            <a:extLst>
-              <a:ext uri="{28A0092B-C50C-407E-A947-70E740481C1C}">
-                <a14:useLocalDpi xmlns:a14="http://schemas.microsoft.com/office/drawing/2010/main" val="0"/>
-              </a:ext>
-              <a:ext uri="{96DAC541-7B7A-43D3-8B79-37D633B846F1}">
-                <asvg:svgBlip xmlns:asvg="http://schemas.microsoft.com/office/drawing/2016/SVG/main" r:embed="rId12"/>
-              </a:ext>
-            </a:extLst>
-          </a:blip>
-          <a:stretch>
-            <a:fillRect/>
-          </a:stretch>
-        </p:blipFill>
-        <p:spPr>
-          <a:xfrm>
-            <a:off x="2704578" y="5699723"/>
-            <a:ext cx="251979" cy="251979"/>
-          </a:xfrm>
-          <a:prstGeom prst="rect">
-            <a:avLst/>
-          </a:prstGeom>
-        </p:spPr>
-      </p:pic>
-      <p:sp>
-        <p:nvSpPr>
-          <p:cNvPr id="84" name="Rectangle 83">
-            <a:extLst>
-              <a:ext uri="{FF2B5EF4-FFF2-40B4-BE49-F238E27FC236}">
-                <a16:creationId xmlns:a16="http://schemas.microsoft.com/office/drawing/2014/main" id="{4BFF43BF-EF17-4EA8-BFF4-6C46DBD8EC95}"/>
-              </a:ext>
-            </a:extLst>
-          </p:cNvPr>
-          <p:cNvSpPr/>
-          <p:nvPr/>
-        </p:nvSpPr>
-        <p:spPr>
-          <a:xfrm>
-            <a:off x="2667533" y="1701047"/>
-            <a:ext cx="3930695" cy="1813556"/>
-          </a:xfrm>
-          <a:prstGeom prst="rect">
-            <a:avLst/>
-          </a:prstGeom>
-          <a:noFill/>
-          <a:ln>
-            <a:prstDash val="lgDash"/>
-          </a:ln>
-        </p:spPr>
-        <p:style>
-          <a:lnRef idx="2">
-            <a:schemeClr val="accent1">
-              <a:shade val="50000"/>
-            </a:schemeClr>
-          </a:lnRef>
-          <a:fillRef idx="1">
-            <a:schemeClr val="accent1"/>
-          </a:fillRef>
-          <a:effectRef idx="0">
-            <a:schemeClr val="accent1"/>
-          </a:effectRef>
-          <a:fontRef idx="minor">
-            <a:schemeClr val="lt1"/>
-          </a:fontRef>
-        </p:style>
-        <p:txBody>
-          <a:bodyPr rtlCol="0" anchor="ctr"/>
-          <a:lstStyle/>
-          <a:p>
-            <a:pPr algn="ctr"/>
-            <a:endParaRPr lang="en-US"/>
-          </a:p>
-        </p:txBody>
-      </p:sp>
-      <p:pic>
-        <p:nvPicPr>
-          <p:cNvPr id="85" name="Graphic 84">
-            <a:extLst>
-              <a:ext uri="{FF2B5EF4-FFF2-40B4-BE49-F238E27FC236}">
-                <a16:creationId xmlns:a16="http://schemas.microsoft.com/office/drawing/2014/main" id="{F42B162A-0AF5-4A4B-8B5B-CA2144BFA801}"/>
-              </a:ext>
-            </a:extLst>
-          </p:cNvPr>
-          <p:cNvPicPr>
-            <a:picLocks noChangeAspect="1"/>
-          </p:cNvPicPr>
-          <p:nvPr/>
-        </p:nvPicPr>
-        <p:blipFill>
-          <a:blip r:embed="rId11">
-            <a:extLst>
-              <a:ext uri="{28A0092B-C50C-407E-A947-70E740481C1C}">
-                <a14:useLocalDpi xmlns:a14="http://schemas.microsoft.com/office/drawing/2010/main" val="0"/>
-              </a:ext>
-              <a:ext uri="{96DAC541-7B7A-43D3-8B79-37D633B846F1}">
-                <asvg:svgBlip xmlns:asvg="http://schemas.microsoft.com/office/drawing/2016/SVG/main" r:embed="rId12"/>
-              </a:ext>
-            </a:extLst>
-          </a:blip>
-          <a:stretch>
-            <a:fillRect/>
-          </a:stretch>
-        </p:blipFill>
-        <p:spPr>
-          <a:xfrm>
-            <a:off x="2697941" y="3286002"/>
-            <a:ext cx="251979" cy="251979"/>
-          </a:xfrm>
-          <a:prstGeom prst="rect">
-            <a:avLst/>
-          </a:prstGeom>
-        </p:spPr>
-      </p:pic>
-      <p:sp>
-        <p:nvSpPr>
-          <p:cNvPr id="86" name="TextBox 85">
-            <a:extLst>
-              <a:ext uri="{FF2B5EF4-FFF2-40B4-BE49-F238E27FC236}">
-                <a16:creationId xmlns:a16="http://schemas.microsoft.com/office/drawing/2014/main" id="{0D76ED6A-AF72-4363-9C6D-72205F9F3D63}"/>
-              </a:ext>
-            </a:extLst>
-          </p:cNvPr>
-          <p:cNvSpPr txBox="1"/>
-          <p:nvPr/>
-        </p:nvSpPr>
-        <p:spPr>
-          <a:xfrm>
-            <a:off x="2905134" y="3288792"/>
-            <a:ext cx="967106" cy="246221"/>
-          </a:xfrm>
-          <a:prstGeom prst="rect">
-            <a:avLst/>
-          </a:prstGeom>
-          <a:noFill/>
-        </p:spPr>
-        <p:txBody>
-          <a:bodyPr wrap="square" rtlCol="0">
-            <a:spAutoFit/>
-          </a:bodyPr>
-          <a:lstStyle/>
-          <a:p>
-            <a:r>
-              <a:rPr lang="en-US" sz="1000" dirty="0"/>
-              <a:t>APIM VNet</a:t>
-            </a:r>
-          </a:p>
-        </p:txBody>
-      </p:sp>
-      <p:sp>
-        <p:nvSpPr>
-          <p:cNvPr id="87" name="TextBox 86">
-            <a:extLst>
-              <a:ext uri="{FF2B5EF4-FFF2-40B4-BE49-F238E27FC236}">
-                <a16:creationId xmlns:a16="http://schemas.microsoft.com/office/drawing/2014/main" id="{01FF6855-8A3A-47DB-8567-4D615C557433}"/>
-              </a:ext>
-            </a:extLst>
-          </p:cNvPr>
-          <p:cNvSpPr txBox="1"/>
-          <p:nvPr/>
-        </p:nvSpPr>
-        <p:spPr>
-          <a:xfrm>
-            <a:off x="2905134" y="5699014"/>
-            <a:ext cx="967106" cy="246221"/>
-          </a:xfrm>
-          <a:prstGeom prst="rect">
-            <a:avLst/>
-          </a:prstGeom>
-          <a:noFill/>
-        </p:spPr>
-        <p:txBody>
-          <a:bodyPr wrap="square" rtlCol="0">
-            <a:spAutoFit/>
-          </a:bodyPr>
-          <a:lstStyle/>
-          <a:p>
-            <a:r>
-              <a:rPr lang="en-US" sz="1000" dirty="0"/>
-              <a:t>AKS VNet</a:t>
-            </a:r>
-          </a:p>
-        </p:txBody>
-      </p:sp>
-      <p:sp>
-        <p:nvSpPr>
-          <p:cNvPr id="90" name="TextBox 89">
-            <a:extLst>
-              <a:ext uri="{FF2B5EF4-FFF2-40B4-BE49-F238E27FC236}">
-                <a16:creationId xmlns:a16="http://schemas.microsoft.com/office/drawing/2014/main" id="{BE6F5629-6E61-4286-8A58-FA42169508C9}"/>
-              </a:ext>
-            </a:extLst>
-          </p:cNvPr>
-          <p:cNvSpPr txBox="1"/>
-          <p:nvPr/>
-        </p:nvSpPr>
-        <p:spPr>
-          <a:xfrm rot="16200000">
-            <a:off x="1758330" y="3490192"/>
-            <a:ext cx="1169726" cy="246221"/>
-          </a:xfrm>
-          <a:prstGeom prst="rect">
-            <a:avLst/>
-          </a:prstGeom>
-          <a:noFill/>
-        </p:spPr>
-        <p:txBody>
-          <a:bodyPr wrap="square" rtlCol="0">
-            <a:spAutoFit/>
-          </a:bodyPr>
-          <a:lstStyle/>
-          <a:p>
-            <a:r>
-              <a:rPr lang="en-US" sz="1000" dirty="0"/>
-              <a:t>VNet peering</a:t>
-            </a:r>
-          </a:p>
-        </p:txBody>
-      </p:sp>
-      <p:sp>
-        <p:nvSpPr>
-          <p:cNvPr id="94" name="Rectangle 93">
-            <a:extLst>
-              <a:ext uri="{FF2B5EF4-FFF2-40B4-BE49-F238E27FC236}">
-                <a16:creationId xmlns:a16="http://schemas.microsoft.com/office/drawing/2014/main" id="{F4F1791A-87EE-4EB6-8CAC-E7715C8E60F3}"/>
-              </a:ext>
-            </a:extLst>
-          </p:cNvPr>
-          <p:cNvSpPr/>
-          <p:nvPr/>
-        </p:nvSpPr>
-        <p:spPr>
-          <a:xfrm>
-            <a:off x="3631223" y="5822124"/>
-            <a:ext cx="2044706" cy="184662"/>
-          </a:xfrm>
-          <a:prstGeom prst="rect">
-            <a:avLst/>
-          </a:prstGeom>
-          <a:solidFill>
-            <a:schemeClr val="accent4">
-              <a:lumMod val="20000"/>
-              <a:lumOff val="80000"/>
-            </a:schemeClr>
-          </a:solidFill>
-        </p:spPr>
-        <p:style>
-          <a:lnRef idx="2">
-            <a:schemeClr val="accent1">
-              <a:shade val="50000"/>
-            </a:schemeClr>
-          </a:lnRef>
-          <a:fillRef idx="1">
-            <a:schemeClr val="accent1"/>
-          </a:fillRef>
-          <a:effectRef idx="0">
-            <a:schemeClr val="accent1"/>
-          </a:effectRef>
-          <a:fontRef idx="minor">
-            <a:schemeClr val="lt1"/>
-          </a:fontRef>
-        </p:style>
-        <p:txBody>
-          <a:bodyPr rtlCol="0" anchor="ctr"/>
-          <a:lstStyle/>
-          <a:p>
-            <a:pPr algn="ctr"/>
-            <a:r>
-              <a:rPr lang="en-US" sz="1000" dirty="0">
-                <a:solidFill>
-                  <a:schemeClr val="tx1"/>
-                </a:solidFill>
-              </a:rPr>
-              <a:t>VNet Service Endpoints</a:t>
-            </a:r>
-          </a:p>
-        </p:txBody>
-      </p:sp>
-      <p:cxnSp>
-        <p:nvCxnSpPr>
-          <p:cNvPr id="96" name="Connector: Elbow 95">
-            <a:extLst>
-              <a:ext uri="{FF2B5EF4-FFF2-40B4-BE49-F238E27FC236}">
-                <a16:creationId xmlns:a16="http://schemas.microsoft.com/office/drawing/2014/main" id="{1691A7DD-32D0-492D-8B1E-91C72F976D2B}"/>
-              </a:ext>
-            </a:extLst>
-          </p:cNvPr>
-          <p:cNvCxnSpPr>
-            <a:cxnSpLocks/>
-            <a:stCxn id="42" idx="1"/>
-            <a:endCxn id="30" idx="0"/>
-          </p:cNvCxnSpPr>
-          <p:nvPr/>
-        </p:nvCxnSpPr>
-        <p:spPr>
-          <a:xfrm rot="10800000" flipV="1">
-            <a:off x="4642657" y="4942728"/>
-            <a:ext cx="801064" cy="1240157"/>
-          </a:xfrm>
-          <a:prstGeom prst="bentConnector2">
-            <a:avLst/>
-          </a:prstGeom>
-          <a:ln>
-            <a:tailEnd type="triangle"/>
-          </a:ln>
-        </p:spPr>
-        <p:style>
-          <a:lnRef idx="1">
-            <a:schemeClr val="accent1"/>
-          </a:lnRef>
-          <a:fillRef idx="0">
-            <a:schemeClr val="accent1"/>
-          </a:fillRef>
-          <a:effectRef idx="0">
-            <a:schemeClr val="accent1"/>
-          </a:effectRef>
-          <a:fontRef idx="minor">
-            <a:schemeClr val="tx1"/>
-          </a:fontRef>
-        </p:style>
-      </p:cxnSp>
-      <p:grpSp>
-        <p:nvGrpSpPr>
-          <p:cNvPr id="98" name="Group 97">
-            <a:extLst>
-              <a:ext uri="{FF2B5EF4-FFF2-40B4-BE49-F238E27FC236}">
-                <a16:creationId xmlns:a16="http://schemas.microsoft.com/office/drawing/2014/main" id="{76A36CAD-880F-4CEC-8331-0F2E294F16D2}"/>
-              </a:ext>
-            </a:extLst>
-          </p:cNvPr>
-          <p:cNvGrpSpPr/>
-          <p:nvPr/>
-        </p:nvGrpSpPr>
-        <p:grpSpPr>
-          <a:xfrm>
-            <a:off x="1125655" y="4731777"/>
-            <a:ext cx="1144865" cy="717444"/>
-            <a:chOff x="1082247" y="4490541"/>
-            <a:chExt cx="1144865" cy="717444"/>
-          </a:xfrm>
-        </p:grpSpPr>
-        <p:pic>
-          <p:nvPicPr>
-            <p:cNvPr id="27" name="Graphic 26">
-              <a:extLst>
-                <a:ext uri="{FF2B5EF4-FFF2-40B4-BE49-F238E27FC236}">
-                  <a16:creationId xmlns:a16="http://schemas.microsoft.com/office/drawing/2014/main" id="{8138B671-7F71-4E17-8C83-D031DF287FC1}"/>
-                </a:ext>
-              </a:extLst>
-            </p:cNvPr>
-            <p:cNvPicPr>
-              <a:picLocks noChangeAspect="1"/>
-            </p:cNvPicPr>
-            <p:nvPr/>
-          </p:nvPicPr>
-          <p:blipFill>
-            <a:blip r:embed="rId13">
-              <a:extLst>
-                <a:ext uri="{28A0092B-C50C-407E-A947-70E740481C1C}">
-                  <a14:useLocalDpi xmlns:a14="http://schemas.microsoft.com/office/drawing/2010/main" val="0"/>
-                </a:ext>
-                <a:ext uri="{96DAC541-7B7A-43D3-8B79-37D633B846F1}">
-                  <asvg:svgBlip xmlns:asvg="http://schemas.microsoft.com/office/drawing/2016/SVG/main" r:embed="rId14"/>
-                </a:ext>
-              </a:extLst>
-            </a:blip>
-            <a:stretch>
-              <a:fillRect/>
-            </a:stretch>
-          </p:blipFill>
-          <p:spPr>
-            <a:xfrm>
-              <a:off x="1422473" y="4490541"/>
-              <a:ext cx="464414" cy="464414"/>
-            </a:xfrm>
-            <a:prstGeom prst="rect">
-              <a:avLst/>
-            </a:prstGeom>
-          </p:spPr>
-        </p:pic>
-        <p:sp>
-          <p:nvSpPr>
-            <p:cNvPr id="97" name="TextBox 96">
-              <a:extLst>
-                <a:ext uri="{FF2B5EF4-FFF2-40B4-BE49-F238E27FC236}">
-                  <a16:creationId xmlns:a16="http://schemas.microsoft.com/office/drawing/2014/main" id="{8C3F45F0-365C-4378-B844-12F3101615BE}"/>
-                </a:ext>
-              </a:extLst>
-            </p:cNvPr>
-            <p:cNvSpPr txBox="1"/>
-            <p:nvPr/>
-          </p:nvSpPr>
-          <p:spPr>
-            <a:xfrm>
-              <a:off x="1082247" y="4961764"/>
-              <a:ext cx="1144865" cy="246221"/>
-            </a:xfrm>
-            <a:prstGeom prst="rect">
-              <a:avLst/>
-            </a:prstGeom>
-            <a:noFill/>
-          </p:spPr>
-          <p:txBody>
-            <a:bodyPr wrap="none" rtlCol="0">
-              <a:spAutoFit/>
-            </a:bodyPr>
-            <a:lstStyle/>
-            <a:p>
-              <a:r>
-                <a:rPr lang="en-US" sz="1000" dirty="0"/>
-                <a:t>Container Registry</a:t>
-              </a:r>
-            </a:p>
-          </p:txBody>
-        </p:sp>
-      </p:grpSp>
-      <p:cxnSp>
-        <p:nvCxnSpPr>
-          <p:cNvPr id="104" name="Connector: Elbow 103">
-            <a:extLst>
-              <a:ext uri="{FF2B5EF4-FFF2-40B4-BE49-F238E27FC236}">
-                <a16:creationId xmlns:a16="http://schemas.microsoft.com/office/drawing/2014/main" id="{64222C99-BEDF-4E7E-A888-F99B3724DB78}"/>
-              </a:ext>
-            </a:extLst>
-          </p:cNvPr>
-          <p:cNvCxnSpPr>
-            <a:cxnSpLocks/>
-            <a:stCxn id="80" idx="1"/>
-            <a:endCxn id="84" idx="1"/>
-          </p:cNvCxnSpPr>
-          <p:nvPr/>
-        </p:nvCxnSpPr>
-        <p:spPr>
-          <a:xfrm rot="10800000" flipH="1">
-            <a:off x="2664069" y="2607825"/>
-            <a:ext cx="3464" cy="2193694"/>
-          </a:xfrm>
-          <a:prstGeom prst="bentConnector3">
-            <a:avLst>
-              <a:gd name="adj1" fmla="val -6599307"/>
-            </a:avLst>
-          </a:prstGeom>
-        </p:spPr>
-        <p:style>
-          <a:lnRef idx="1">
-            <a:schemeClr val="accent1"/>
-          </a:lnRef>
-          <a:fillRef idx="0">
-            <a:schemeClr val="accent1"/>
-          </a:fillRef>
-          <a:effectRef idx="0">
-            <a:schemeClr val="accent1"/>
-          </a:effectRef>
-          <a:fontRef idx="minor">
-            <a:schemeClr val="tx1"/>
-          </a:fontRef>
-        </p:style>
-      </p:cxnSp>
-      <p:cxnSp>
-        <p:nvCxnSpPr>
-          <p:cNvPr id="8" name="Connector: Elbow 7">
-            <a:extLst>
-              <a:ext uri="{FF2B5EF4-FFF2-40B4-BE49-F238E27FC236}">
-                <a16:creationId xmlns:a16="http://schemas.microsoft.com/office/drawing/2014/main" id="{3479C7C3-4328-4B2C-A263-ADCA6A5D800F}"/>
-              </a:ext>
-            </a:extLst>
-          </p:cNvPr>
-          <p:cNvCxnSpPr>
-            <a:cxnSpLocks/>
-            <a:stCxn id="42" idx="3"/>
-            <a:endCxn id="37" idx="0"/>
-          </p:cNvCxnSpPr>
-          <p:nvPr/>
-        </p:nvCxnSpPr>
-        <p:spPr>
-          <a:xfrm>
-            <a:off x="5908137" y="4942729"/>
-            <a:ext cx="317644" cy="1241369"/>
-          </a:xfrm>
-          <a:prstGeom prst="bentConnector2">
-            <a:avLst/>
-          </a:prstGeom>
-          <a:ln>
-            <a:tailEnd type="triangle"/>
-          </a:ln>
-        </p:spPr>
-        <p:style>
-          <a:lnRef idx="1">
-            <a:schemeClr val="accent1"/>
-          </a:lnRef>
-          <a:fillRef idx="0">
-            <a:schemeClr val="accent1"/>
-          </a:fillRef>
-          <a:effectRef idx="0">
-            <a:schemeClr val="accent1"/>
-          </a:effectRef>
-          <a:fontRef idx="minor">
-            <a:schemeClr val="tx1"/>
-          </a:fontRef>
-        </p:style>
-      </p:cxnSp>
-      <p:pic>
-        <p:nvPicPr>
-          <p:cNvPr id="13" name="Picture 12">
-            <a:extLst>
-              <a:ext uri="{FF2B5EF4-FFF2-40B4-BE49-F238E27FC236}">
-                <a16:creationId xmlns:a16="http://schemas.microsoft.com/office/drawing/2014/main" id="{4CC2C820-C2AE-44C7-BF18-B5F32EF48AD4}"/>
-              </a:ext>
-            </a:extLst>
-          </p:cNvPr>
-          <p:cNvPicPr>
-            <a:picLocks noChangeAspect="1"/>
-          </p:cNvPicPr>
-          <p:nvPr/>
-        </p:nvPicPr>
-        <p:blipFill>
-          <a:blip r:embed="rId15"/>
-          <a:stretch>
-            <a:fillRect/>
-          </a:stretch>
-        </p:blipFill>
-        <p:spPr>
-          <a:xfrm>
-            <a:off x="7128925" y="6162032"/>
-            <a:ext cx="701101" cy="426757"/>
-          </a:xfrm>
-          <a:prstGeom prst="rect">
-            <a:avLst/>
-          </a:prstGeom>
-        </p:spPr>
-      </p:pic>
-      <p:cxnSp>
-        <p:nvCxnSpPr>
-          <p:cNvPr id="16" name="Connector: Elbow 15">
-            <a:extLst>
-              <a:ext uri="{FF2B5EF4-FFF2-40B4-BE49-F238E27FC236}">
-                <a16:creationId xmlns:a16="http://schemas.microsoft.com/office/drawing/2014/main" id="{AFB06820-2BCA-4A48-9787-E762AC5FDE31}"/>
-              </a:ext>
-            </a:extLst>
-          </p:cNvPr>
-          <p:cNvCxnSpPr>
-            <a:cxnSpLocks/>
-            <a:stCxn id="37" idx="3"/>
-            <a:endCxn id="13" idx="1"/>
-          </p:cNvCxnSpPr>
-          <p:nvPr/>
-        </p:nvCxnSpPr>
-        <p:spPr>
-          <a:xfrm>
-            <a:off x="6411527" y="6369844"/>
-            <a:ext cx="717398" cy="5567"/>
-          </a:xfrm>
-          <a:prstGeom prst="bentConnector3">
-            <a:avLst/>
-          </a:prstGeom>
-          <a:ln>
-            <a:tailEnd type="triangle"/>
-          </a:ln>
-        </p:spPr>
-        <p:style>
-          <a:lnRef idx="1">
-            <a:schemeClr val="accent1"/>
-          </a:lnRef>
-          <a:fillRef idx="0">
-            <a:schemeClr val="accent1"/>
-          </a:fillRef>
-          <a:effectRef idx="0">
-            <a:schemeClr val="accent1"/>
-          </a:effectRef>
-          <a:fontRef idx="minor">
-            <a:schemeClr val="tx1"/>
-          </a:fontRef>
-        </p:style>
-      </p:cxnSp>
-      <p:grpSp>
-        <p:nvGrpSpPr>
-          <p:cNvPr id="20" name="Group 19">
-            <a:extLst>
-              <a:ext uri="{FF2B5EF4-FFF2-40B4-BE49-F238E27FC236}">
-                <a16:creationId xmlns:a16="http://schemas.microsoft.com/office/drawing/2014/main" id="{6E95E8B4-B833-424A-9C50-3748026F3D55}"/>
-              </a:ext>
-            </a:extLst>
-          </p:cNvPr>
-          <p:cNvGrpSpPr/>
-          <p:nvPr/>
-        </p:nvGrpSpPr>
-        <p:grpSpPr>
-          <a:xfrm>
-            <a:off x="6959581" y="2815283"/>
-            <a:ext cx="967106" cy="694214"/>
-            <a:chOff x="6959581" y="2815283"/>
-            <a:chExt cx="967106" cy="694214"/>
-          </a:xfrm>
-        </p:grpSpPr>
-        <p:pic>
-          <p:nvPicPr>
-            <p:cNvPr id="32" name="Graphic 31">
-              <a:extLst>
-                <a:ext uri="{FF2B5EF4-FFF2-40B4-BE49-F238E27FC236}">
-                  <a16:creationId xmlns:a16="http://schemas.microsoft.com/office/drawing/2014/main" id="{D551EEB9-6F87-46CB-8FD5-78AD74791A24}"/>
-                </a:ext>
-              </a:extLst>
-            </p:cNvPr>
-            <p:cNvPicPr>
-              <a:picLocks noChangeAspect="1"/>
-            </p:cNvPicPr>
-            <p:nvPr/>
-          </p:nvPicPr>
-          <p:blipFill>
-            <a:blip r:embed="rId16">
-              <a:extLst>
-                <a:ext uri="{28A0092B-C50C-407E-A947-70E740481C1C}">
-                  <a14:useLocalDpi xmlns:a14="http://schemas.microsoft.com/office/drawing/2010/main" val="0"/>
-                </a:ext>
-                <a:ext uri="{96DAC541-7B7A-43D3-8B79-37D633B846F1}">
-                  <asvg:svgBlip xmlns:asvg="http://schemas.microsoft.com/office/drawing/2016/SVG/main" r:embed="rId17"/>
-                </a:ext>
-              </a:extLst>
-            </a:blip>
-            <a:stretch>
-              <a:fillRect/>
-            </a:stretch>
-          </p:blipFill>
-          <p:spPr>
-            <a:xfrm>
-              <a:off x="7210927" y="2815283"/>
-              <a:ext cx="464414" cy="464414"/>
-            </a:xfrm>
-            <a:prstGeom prst="rect">
-              <a:avLst/>
-            </a:prstGeom>
-          </p:spPr>
-        </p:pic>
-        <p:sp>
-          <p:nvSpPr>
-            <p:cNvPr id="58" name="TextBox 57">
-              <a:extLst>
-                <a:ext uri="{FF2B5EF4-FFF2-40B4-BE49-F238E27FC236}">
-                  <a16:creationId xmlns:a16="http://schemas.microsoft.com/office/drawing/2014/main" id="{DF2116D3-E722-45A8-B829-22245B693CA0}"/>
-                </a:ext>
-              </a:extLst>
-            </p:cNvPr>
-            <p:cNvSpPr txBox="1"/>
-            <p:nvPr/>
-          </p:nvSpPr>
-          <p:spPr>
-            <a:xfrm>
-              <a:off x="6959581" y="3263276"/>
-              <a:ext cx="967106" cy="246221"/>
-            </a:xfrm>
-            <a:prstGeom prst="rect">
-              <a:avLst/>
-            </a:prstGeom>
-            <a:noFill/>
-          </p:spPr>
-          <p:txBody>
-            <a:bodyPr wrap="square" rtlCol="0">
-              <a:spAutoFit/>
-            </a:bodyPr>
-            <a:lstStyle/>
-            <a:p>
-              <a:pPr algn="ctr"/>
-              <a:r>
-                <a:rPr lang="en-US" sz="1000" dirty="0"/>
-                <a:t>Monitor</a:t>
-              </a:r>
-            </a:p>
-          </p:txBody>
-        </p:sp>
-      </p:grpSp>
-      <p:grpSp>
-        <p:nvGrpSpPr>
-          <p:cNvPr id="26" name="Group 25">
-            <a:extLst>
-              <a:ext uri="{FF2B5EF4-FFF2-40B4-BE49-F238E27FC236}">
-                <a16:creationId xmlns:a16="http://schemas.microsoft.com/office/drawing/2014/main" id="{58BC0E6F-EB06-486A-94E5-8256680F70BD}"/>
-              </a:ext>
-            </a:extLst>
-          </p:cNvPr>
-          <p:cNvGrpSpPr/>
-          <p:nvPr/>
-        </p:nvGrpSpPr>
-        <p:grpSpPr>
-          <a:xfrm>
-            <a:off x="1930295" y="4931242"/>
-            <a:ext cx="1574998" cy="246221"/>
-            <a:chOff x="1930295" y="4931242"/>
-            <a:chExt cx="1574998" cy="246221"/>
-          </a:xfrm>
-        </p:grpSpPr>
-        <p:cxnSp>
-          <p:nvCxnSpPr>
-            <p:cNvPr id="22" name="Straight Arrow Connector 21">
-              <a:extLst>
-                <a:ext uri="{FF2B5EF4-FFF2-40B4-BE49-F238E27FC236}">
-                  <a16:creationId xmlns:a16="http://schemas.microsoft.com/office/drawing/2014/main" id="{896D548D-1BDE-4B48-A27D-3C1ABC29932A}"/>
-                </a:ext>
-              </a:extLst>
-            </p:cNvPr>
-            <p:cNvCxnSpPr>
-              <a:cxnSpLocks/>
-              <a:stCxn id="7" idx="1"/>
-              <a:endCxn id="27" idx="3"/>
-            </p:cNvCxnSpPr>
-            <p:nvPr/>
-          </p:nvCxnSpPr>
-          <p:spPr>
-            <a:xfrm flipH="1">
-              <a:off x="1930295" y="4958772"/>
-              <a:ext cx="1574998" cy="5212"/>
-            </a:xfrm>
-            <a:prstGeom prst="straightConnector1">
-              <a:avLst/>
-            </a:prstGeom>
-            <a:ln>
-              <a:tailEnd type="triangle"/>
-            </a:ln>
-          </p:spPr>
-          <p:style>
-            <a:lnRef idx="1">
-              <a:schemeClr val="accent1"/>
-            </a:lnRef>
-            <a:fillRef idx="0">
-              <a:schemeClr val="accent1"/>
-            </a:fillRef>
-            <a:effectRef idx="0">
-              <a:schemeClr val="accent1"/>
-            </a:effectRef>
-            <a:fontRef idx="minor">
-              <a:schemeClr val="tx1"/>
-            </a:fontRef>
-          </p:style>
-        </p:cxnSp>
-        <p:sp>
-          <p:nvSpPr>
-            <p:cNvPr id="64" name="TextBox 63">
-              <a:extLst>
-                <a:ext uri="{FF2B5EF4-FFF2-40B4-BE49-F238E27FC236}">
-                  <a16:creationId xmlns:a16="http://schemas.microsoft.com/office/drawing/2014/main" id="{A45D468A-5E45-4F67-8979-B17153029538}"/>
-                </a:ext>
-              </a:extLst>
-            </p:cNvPr>
-            <p:cNvSpPr txBox="1"/>
-            <p:nvPr/>
-          </p:nvSpPr>
-          <p:spPr>
-            <a:xfrm>
-              <a:off x="2193625" y="4931242"/>
-              <a:ext cx="405635" cy="246221"/>
-            </a:xfrm>
-            <a:prstGeom prst="rect">
-              <a:avLst/>
-            </a:prstGeom>
-            <a:noFill/>
-          </p:spPr>
-          <p:txBody>
-            <a:bodyPr wrap="square" rtlCol="0">
-              <a:spAutoFit/>
-            </a:bodyPr>
-            <a:lstStyle/>
-            <a:p>
-              <a:r>
-                <a:rPr lang="en-US" sz="1000" dirty="0"/>
-                <a:t>pull</a:t>
-              </a:r>
-            </a:p>
-          </p:txBody>
-        </p:sp>
-      </p:grpSp>
-      <p:grpSp>
-        <p:nvGrpSpPr>
-          <p:cNvPr id="28" name="Group 27">
-            <a:extLst>
-              <a:ext uri="{FF2B5EF4-FFF2-40B4-BE49-F238E27FC236}">
-                <a16:creationId xmlns:a16="http://schemas.microsoft.com/office/drawing/2014/main" id="{4B3E869A-0ABB-4151-B63D-24F6142B5196}"/>
-              </a:ext>
-            </a:extLst>
-          </p:cNvPr>
-          <p:cNvGrpSpPr/>
-          <p:nvPr/>
-        </p:nvGrpSpPr>
-        <p:grpSpPr>
-          <a:xfrm>
-            <a:off x="4284452" y="2780979"/>
-            <a:ext cx="1726053" cy="464415"/>
-            <a:chOff x="4284452" y="2780979"/>
-            <a:chExt cx="1726053" cy="464415"/>
-          </a:xfrm>
-        </p:grpSpPr>
-        <p:pic>
-          <p:nvPicPr>
-            <p:cNvPr id="12" name="Graphic 11">
-              <a:extLst>
-                <a:ext uri="{FF2B5EF4-FFF2-40B4-BE49-F238E27FC236}">
-                  <a16:creationId xmlns:a16="http://schemas.microsoft.com/office/drawing/2014/main" id="{2F77943D-6513-4FDF-9EC7-0AA5AC0DB242}"/>
-                </a:ext>
-              </a:extLst>
-            </p:cNvPr>
-            <p:cNvPicPr>
-              <a:picLocks noChangeAspect="1"/>
-            </p:cNvPicPr>
-            <p:nvPr/>
-          </p:nvPicPr>
-          <p:blipFill>
-            <a:blip r:embed="rId18">
-              <a:extLst>
-                <a:ext uri="{28A0092B-C50C-407E-A947-70E740481C1C}">
-                  <a14:useLocalDpi xmlns:a14="http://schemas.microsoft.com/office/drawing/2010/main" val="0"/>
-                </a:ext>
-                <a:ext uri="{96DAC541-7B7A-43D3-8B79-37D633B846F1}">
-                  <asvg:svgBlip xmlns:asvg="http://schemas.microsoft.com/office/drawing/2016/SVG/main" r:embed="rId19"/>
-                </a:ext>
-              </a:extLst>
-            </a:blip>
-            <a:stretch>
-              <a:fillRect/>
-            </a:stretch>
-          </p:blipFill>
-          <p:spPr>
-            <a:xfrm>
-              <a:off x="4284452" y="2780979"/>
-              <a:ext cx="464415" cy="464415"/>
-            </a:xfrm>
-            <a:prstGeom prst="rect">
-              <a:avLst/>
-            </a:prstGeom>
-          </p:spPr>
-        </p:pic>
-        <p:sp>
-          <p:nvSpPr>
-            <p:cNvPr id="66" name="TextBox 65">
-              <a:extLst>
-                <a:ext uri="{FF2B5EF4-FFF2-40B4-BE49-F238E27FC236}">
-                  <a16:creationId xmlns:a16="http://schemas.microsoft.com/office/drawing/2014/main" id="{103B8D38-6883-4361-8AAB-DC4EC3A77339}"/>
-                </a:ext>
-              </a:extLst>
-            </p:cNvPr>
-            <p:cNvSpPr txBox="1"/>
-            <p:nvPr/>
-          </p:nvSpPr>
-          <p:spPr>
-            <a:xfrm>
-              <a:off x="4682050" y="2868247"/>
-              <a:ext cx="1328455" cy="246221"/>
-            </a:xfrm>
-            <a:prstGeom prst="rect">
-              <a:avLst/>
-            </a:prstGeom>
-            <a:noFill/>
-          </p:spPr>
-          <p:txBody>
-            <a:bodyPr wrap="square" rtlCol="0">
-              <a:spAutoFit/>
-            </a:bodyPr>
-            <a:lstStyle/>
-            <a:p>
-              <a:r>
-                <a:rPr lang="en-US" sz="1000" dirty="0"/>
-                <a:t>API Management</a:t>
-              </a:r>
-            </a:p>
-          </p:txBody>
-        </p:sp>
-      </p:grpSp>
-      <p:grpSp>
-        <p:nvGrpSpPr>
-          <p:cNvPr id="31" name="Group 30">
-            <a:extLst>
-              <a:ext uri="{FF2B5EF4-FFF2-40B4-BE49-F238E27FC236}">
-                <a16:creationId xmlns:a16="http://schemas.microsoft.com/office/drawing/2014/main" id="{A2BEAC5D-4125-4E5C-A31E-A06B5865050F}"/>
-              </a:ext>
-            </a:extLst>
-          </p:cNvPr>
-          <p:cNvGrpSpPr/>
-          <p:nvPr/>
-        </p:nvGrpSpPr>
-        <p:grpSpPr>
-          <a:xfrm>
-            <a:off x="4283993" y="1947671"/>
-            <a:ext cx="1752772" cy="464415"/>
-            <a:chOff x="4283993" y="1947671"/>
-            <a:chExt cx="1752772" cy="464415"/>
-          </a:xfrm>
-        </p:grpSpPr>
-        <p:pic>
-          <p:nvPicPr>
-            <p:cNvPr id="23" name="Graphic 22">
-              <a:extLst>
-                <a:ext uri="{FF2B5EF4-FFF2-40B4-BE49-F238E27FC236}">
-                  <a16:creationId xmlns:a16="http://schemas.microsoft.com/office/drawing/2014/main" id="{AF4D93CD-C43A-4FC4-B01C-923F7F2C06A9}"/>
-                </a:ext>
-              </a:extLst>
-            </p:cNvPr>
-            <p:cNvPicPr>
-              <a:picLocks noChangeAspect="1"/>
-            </p:cNvPicPr>
-            <p:nvPr/>
-          </p:nvPicPr>
-          <p:blipFill>
-            <a:blip r:embed="rId20">
-              <a:extLst>
-                <a:ext uri="{28A0092B-C50C-407E-A947-70E740481C1C}">
-                  <a14:useLocalDpi xmlns:a14="http://schemas.microsoft.com/office/drawing/2010/main" val="0"/>
-                </a:ext>
-                <a:ext uri="{96DAC541-7B7A-43D3-8B79-37D633B846F1}">
-                  <asvg:svgBlip xmlns:asvg="http://schemas.microsoft.com/office/drawing/2016/SVG/main" r:embed="rId21"/>
-                </a:ext>
-              </a:extLst>
-            </a:blip>
-            <a:stretch>
-              <a:fillRect/>
-            </a:stretch>
-          </p:blipFill>
-          <p:spPr>
-            <a:xfrm>
-              <a:off x="4283993" y="1947671"/>
-              <a:ext cx="464415" cy="464415"/>
-            </a:xfrm>
-            <a:prstGeom prst="rect">
-              <a:avLst/>
-            </a:prstGeom>
-          </p:spPr>
-        </p:pic>
-        <p:sp>
-          <p:nvSpPr>
-            <p:cNvPr id="68" name="TextBox 67">
-              <a:extLst>
-                <a:ext uri="{FF2B5EF4-FFF2-40B4-BE49-F238E27FC236}">
-                  <a16:creationId xmlns:a16="http://schemas.microsoft.com/office/drawing/2014/main" id="{7A821648-61D5-42D3-A525-7A240E07672F}"/>
-                </a:ext>
-              </a:extLst>
-            </p:cNvPr>
-            <p:cNvSpPr txBox="1"/>
-            <p:nvPr/>
-          </p:nvSpPr>
-          <p:spPr>
-            <a:xfrm>
-              <a:off x="4684976" y="1979968"/>
-              <a:ext cx="1351789" cy="400110"/>
-            </a:xfrm>
-            <a:prstGeom prst="rect">
-              <a:avLst/>
-            </a:prstGeom>
-            <a:noFill/>
-          </p:spPr>
-          <p:txBody>
-            <a:bodyPr wrap="square" rtlCol="0">
-              <a:spAutoFit/>
-            </a:bodyPr>
-            <a:lstStyle/>
-            <a:p>
-              <a:r>
-                <a:rPr lang="en-US" sz="1000" dirty="0"/>
-                <a:t>Application Gateway</a:t>
-              </a:r>
-            </a:p>
-            <a:p>
-              <a:r>
-                <a:rPr lang="en-US" sz="1000" dirty="0"/>
-                <a:t>WAF</a:t>
-              </a:r>
-            </a:p>
-          </p:txBody>
-        </p:sp>
-      </p:grpSp>
-      <p:grpSp>
-        <p:nvGrpSpPr>
-          <p:cNvPr id="33" name="Group 32">
-            <a:extLst>
-              <a:ext uri="{FF2B5EF4-FFF2-40B4-BE49-F238E27FC236}">
-                <a16:creationId xmlns:a16="http://schemas.microsoft.com/office/drawing/2014/main" id="{8E0A9DAD-0490-438B-BF9C-F91289E8201E}"/>
-              </a:ext>
-            </a:extLst>
-          </p:cNvPr>
-          <p:cNvGrpSpPr/>
-          <p:nvPr/>
-        </p:nvGrpSpPr>
-        <p:grpSpPr>
-          <a:xfrm>
-            <a:off x="5546096" y="1075303"/>
-            <a:ext cx="1379820" cy="464414"/>
-            <a:chOff x="5546096" y="1108555"/>
-            <a:chExt cx="1379820" cy="464414"/>
-          </a:xfrm>
-        </p:grpSpPr>
-        <p:pic>
-          <p:nvPicPr>
-            <p:cNvPr id="100" name="Graphic 99">
-              <a:extLst>
-                <a:ext uri="{FF2B5EF4-FFF2-40B4-BE49-F238E27FC236}">
-                  <a16:creationId xmlns:a16="http://schemas.microsoft.com/office/drawing/2014/main" id="{EBDD02B5-2457-4891-ABC8-B950A57EF750}"/>
-                </a:ext>
-              </a:extLst>
-            </p:cNvPr>
-            <p:cNvPicPr>
-              <a:picLocks noChangeAspect="1"/>
-            </p:cNvPicPr>
-            <p:nvPr/>
-          </p:nvPicPr>
-          <p:blipFill>
-            <a:blip r:embed="rId22">
-              <a:extLst>
-                <a:ext uri="{28A0092B-C50C-407E-A947-70E740481C1C}">
-                  <a14:useLocalDpi xmlns:a14="http://schemas.microsoft.com/office/drawing/2010/main" val="0"/>
-                </a:ext>
-                <a:ext uri="{96DAC541-7B7A-43D3-8B79-37D633B846F1}">
-                  <asvg:svgBlip xmlns:asvg="http://schemas.microsoft.com/office/drawing/2016/SVG/main" r:embed="rId23"/>
-                </a:ext>
-              </a:extLst>
-            </a:blip>
-            <a:stretch>
-              <a:fillRect/>
-            </a:stretch>
-          </p:blipFill>
-          <p:spPr>
-            <a:xfrm>
-              <a:off x="5546096" y="1108555"/>
-              <a:ext cx="464414" cy="464414"/>
-            </a:xfrm>
-            <a:prstGeom prst="rect">
-              <a:avLst/>
-            </a:prstGeom>
-          </p:spPr>
-        </p:pic>
-        <p:sp>
-          <p:nvSpPr>
-            <p:cNvPr id="71" name="TextBox 70">
-              <a:extLst>
-                <a:ext uri="{FF2B5EF4-FFF2-40B4-BE49-F238E27FC236}">
-                  <a16:creationId xmlns:a16="http://schemas.microsoft.com/office/drawing/2014/main" id="{2F98AFB6-8C29-4C38-8652-22E9185C2BEC}"/>
-                </a:ext>
-              </a:extLst>
-            </p:cNvPr>
-            <p:cNvSpPr txBox="1"/>
-            <p:nvPr/>
-          </p:nvSpPr>
-          <p:spPr>
-            <a:xfrm>
-              <a:off x="5958810" y="1217435"/>
-              <a:ext cx="967106" cy="246221"/>
-            </a:xfrm>
-            <a:prstGeom prst="rect">
-              <a:avLst/>
-            </a:prstGeom>
-            <a:noFill/>
-          </p:spPr>
-          <p:txBody>
-            <a:bodyPr wrap="square" rtlCol="0">
-              <a:spAutoFit/>
-            </a:bodyPr>
-            <a:lstStyle/>
-            <a:p>
-              <a:r>
-                <a:rPr lang="en-US" sz="1000" dirty="0"/>
-                <a:t>Front Door</a:t>
-              </a:r>
-            </a:p>
-          </p:txBody>
-        </p:sp>
-      </p:grpSp>
-      <p:pic>
-        <p:nvPicPr>
-          <p:cNvPr id="35" name="Graphic 34">
-            <a:extLst>
-              <a:ext uri="{FF2B5EF4-FFF2-40B4-BE49-F238E27FC236}">
-                <a16:creationId xmlns:a16="http://schemas.microsoft.com/office/drawing/2014/main" id="{AA8DFD16-8C4D-4636-894D-1D61EE64B8DA}"/>
-              </a:ext>
-            </a:extLst>
-          </p:cNvPr>
-          <p:cNvPicPr>
-            <a:picLocks noChangeAspect="1"/>
-          </p:cNvPicPr>
-          <p:nvPr/>
-        </p:nvPicPr>
-        <p:blipFill>
-          <a:blip r:embed="rId24">
-            <a:extLst>
-              <a:ext uri="{28A0092B-C50C-407E-A947-70E740481C1C}">
-                <a14:useLocalDpi xmlns:a14="http://schemas.microsoft.com/office/drawing/2010/main" val="0"/>
-              </a:ext>
-              <a:ext uri="{96DAC541-7B7A-43D3-8B79-37D633B846F1}">
-                <asvg:svgBlip xmlns:asvg="http://schemas.microsoft.com/office/drawing/2016/SVG/main" r:embed="rId25"/>
-              </a:ext>
-            </a:extLst>
-          </a:blip>
-          <a:stretch>
-            <a:fillRect/>
-          </a:stretch>
-        </p:blipFill>
-        <p:spPr>
-          <a:xfrm>
-            <a:off x="6255847" y="3777119"/>
-            <a:ext cx="171450" cy="171450"/>
-          </a:xfrm>
-          <a:prstGeom prst="rect">
-            <a:avLst/>
-          </a:prstGeom>
-        </p:spPr>
-      </p:pic>
-      <p:pic>
-        <p:nvPicPr>
-          <p:cNvPr id="75" name="Graphic 74">
-            <a:extLst>
-              <a:ext uri="{FF2B5EF4-FFF2-40B4-BE49-F238E27FC236}">
-                <a16:creationId xmlns:a16="http://schemas.microsoft.com/office/drawing/2014/main" id="{D502F66E-19DF-470E-82F2-3090370EB01C}"/>
-              </a:ext>
-            </a:extLst>
-          </p:cNvPr>
-          <p:cNvPicPr>
-            <a:picLocks noChangeAspect="1"/>
-          </p:cNvPicPr>
-          <p:nvPr/>
-        </p:nvPicPr>
-        <p:blipFill>
-          <a:blip r:embed="rId24">
-            <a:extLst>
-              <a:ext uri="{28A0092B-C50C-407E-A947-70E740481C1C}">
-                <a14:useLocalDpi xmlns:a14="http://schemas.microsoft.com/office/drawing/2010/main" val="0"/>
-              </a:ext>
-              <a:ext uri="{96DAC541-7B7A-43D3-8B79-37D633B846F1}">
-                <asvg:svgBlip xmlns:asvg="http://schemas.microsoft.com/office/drawing/2016/SVG/main" r:embed="rId25"/>
-              </a:ext>
-            </a:extLst>
-          </a:blip>
-          <a:stretch>
-            <a:fillRect/>
-          </a:stretch>
-        </p:blipFill>
-        <p:spPr>
-          <a:xfrm>
-            <a:off x="6257040" y="2591688"/>
-            <a:ext cx="171450" cy="171450"/>
-          </a:xfrm>
-          <a:prstGeom prst="rect">
-            <a:avLst/>
-          </a:prstGeom>
-        </p:spPr>
-      </p:pic>
-      <p:pic>
-        <p:nvPicPr>
-          <p:cNvPr id="81" name="Graphic 80">
-            <a:extLst>
-              <a:ext uri="{FF2B5EF4-FFF2-40B4-BE49-F238E27FC236}">
-                <a16:creationId xmlns:a16="http://schemas.microsoft.com/office/drawing/2014/main" id="{E99803F2-C81B-4B1D-8CD6-FC1A76C0ABF5}"/>
-              </a:ext>
-            </a:extLst>
-          </p:cNvPr>
-          <p:cNvPicPr>
-            <a:picLocks noChangeAspect="1"/>
-          </p:cNvPicPr>
-          <p:nvPr/>
-        </p:nvPicPr>
-        <p:blipFill>
-          <a:blip r:embed="rId24">
-            <a:extLst>
-              <a:ext uri="{28A0092B-C50C-407E-A947-70E740481C1C}">
-                <a14:useLocalDpi xmlns:a14="http://schemas.microsoft.com/office/drawing/2010/main" val="0"/>
-              </a:ext>
-              <a:ext uri="{96DAC541-7B7A-43D3-8B79-37D633B846F1}">
-                <asvg:svgBlip xmlns:asvg="http://schemas.microsoft.com/office/drawing/2016/SVG/main" r:embed="rId25"/>
-              </a:ext>
-            </a:extLst>
-          </a:blip>
-          <a:stretch>
-            <a:fillRect/>
-          </a:stretch>
-        </p:blipFill>
-        <p:spPr>
-          <a:xfrm>
-            <a:off x="6250208" y="1810946"/>
-            <a:ext cx="171450" cy="171450"/>
-          </a:xfrm>
-          <a:prstGeom prst="rect">
-            <a:avLst/>
-          </a:prstGeom>
-        </p:spPr>
-      </p:pic>
-      <p:grpSp>
-        <p:nvGrpSpPr>
-          <p:cNvPr id="40" name="Group 39">
-            <a:extLst>
-              <a:ext uri="{FF2B5EF4-FFF2-40B4-BE49-F238E27FC236}">
-                <a16:creationId xmlns:a16="http://schemas.microsoft.com/office/drawing/2014/main" id="{D8B6A42D-8108-4C3E-8783-44E39A8152D1}"/>
-              </a:ext>
-            </a:extLst>
-          </p:cNvPr>
-          <p:cNvGrpSpPr/>
-          <p:nvPr/>
-        </p:nvGrpSpPr>
-        <p:grpSpPr>
-          <a:xfrm>
-            <a:off x="5874507" y="6184098"/>
-            <a:ext cx="701101" cy="528576"/>
-            <a:chOff x="5823976" y="5580210"/>
-            <a:chExt cx="701101" cy="528576"/>
-          </a:xfrm>
-        </p:grpSpPr>
-        <p:sp>
-          <p:nvSpPr>
-            <p:cNvPr id="52" name="TextBox 51">
-              <a:extLst>
-                <a:ext uri="{FF2B5EF4-FFF2-40B4-BE49-F238E27FC236}">
-                  <a16:creationId xmlns:a16="http://schemas.microsoft.com/office/drawing/2014/main" id="{2AA891F3-A26D-44F4-AA3F-84AEF4F46C66}"/>
-                </a:ext>
-              </a:extLst>
-            </p:cNvPr>
-            <p:cNvSpPr txBox="1"/>
-            <p:nvPr/>
-          </p:nvSpPr>
-          <p:spPr>
-            <a:xfrm>
-              <a:off x="5823976" y="5862565"/>
-              <a:ext cx="701101" cy="246221"/>
-            </a:xfrm>
-            <a:prstGeom prst="rect">
-              <a:avLst/>
-            </a:prstGeom>
-            <a:noFill/>
-          </p:spPr>
-          <p:txBody>
-            <a:bodyPr wrap="square" rtlCol="0">
-              <a:spAutoFit/>
-            </a:bodyPr>
-            <a:lstStyle/>
-            <a:p>
-              <a:pPr algn="ctr"/>
-              <a:r>
-                <a:rPr lang="en-US" sz="1000" dirty="0"/>
-                <a:t>egress IP</a:t>
-              </a:r>
-            </a:p>
-          </p:txBody>
-        </p:sp>
-        <p:pic>
-          <p:nvPicPr>
-            <p:cNvPr id="37" name="Graphic 36">
-              <a:extLst>
-                <a:ext uri="{FF2B5EF4-FFF2-40B4-BE49-F238E27FC236}">
-                  <a16:creationId xmlns:a16="http://schemas.microsoft.com/office/drawing/2014/main" id="{32DBFB4D-4EFB-4B25-B98C-8EDB3B49D3A4}"/>
-                </a:ext>
-              </a:extLst>
-            </p:cNvPr>
-            <p:cNvPicPr>
-              <a:picLocks noChangeAspect="1"/>
-            </p:cNvPicPr>
-            <p:nvPr/>
-          </p:nvPicPr>
-          <p:blipFill>
-            <a:blip r:embed="rId26">
-              <a:extLst>
-                <a:ext uri="{28A0092B-C50C-407E-A947-70E740481C1C}">
-                  <a14:useLocalDpi xmlns:a14="http://schemas.microsoft.com/office/drawing/2010/main" val="0"/>
-                </a:ext>
-                <a:ext uri="{96DAC541-7B7A-43D3-8B79-37D633B846F1}">
-                  <asvg:svgBlip xmlns:asvg="http://schemas.microsoft.com/office/drawing/2016/SVG/main" r:embed="rId27"/>
-                </a:ext>
-              </a:extLst>
-            </a:blip>
-            <a:stretch>
-              <a:fillRect/>
-            </a:stretch>
-          </p:blipFill>
-          <p:spPr>
-            <a:xfrm>
-              <a:off x="5989504" y="5580210"/>
-              <a:ext cx="371492" cy="371492"/>
-            </a:xfrm>
-            <a:prstGeom prst="rect">
-              <a:avLst/>
-            </a:prstGeom>
-          </p:spPr>
-        </p:pic>
-      </p:grpSp>
-      <p:cxnSp>
-        <p:nvCxnSpPr>
-          <p:cNvPr id="59" name="Connector: Elbow 58">
-            <a:extLst>
-              <a:ext uri="{FF2B5EF4-FFF2-40B4-BE49-F238E27FC236}">
-                <a16:creationId xmlns:a16="http://schemas.microsoft.com/office/drawing/2014/main" id="{3E1CE9E3-A4D7-43AA-BCDF-AD91D6300A53}"/>
-              </a:ext>
-            </a:extLst>
-          </p:cNvPr>
-          <p:cNvCxnSpPr>
-            <a:cxnSpLocks/>
-            <a:stCxn id="42" idx="1"/>
-            <a:endCxn id="56" idx="0"/>
-          </p:cNvCxnSpPr>
-          <p:nvPr/>
-        </p:nvCxnSpPr>
-        <p:spPr>
-          <a:xfrm rot="10800000" flipV="1">
-            <a:off x="5308191" y="4942729"/>
-            <a:ext cx="135530" cy="1239908"/>
-          </a:xfrm>
-          <a:prstGeom prst="bentConnector2">
-            <a:avLst/>
-          </a:prstGeom>
-          <a:ln>
-            <a:tailEnd type="triangle"/>
-          </a:ln>
-        </p:spPr>
-        <p:style>
-          <a:lnRef idx="1">
-            <a:schemeClr val="accent1"/>
-          </a:lnRef>
-          <a:fillRef idx="0">
-            <a:schemeClr val="accent1"/>
-          </a:fillRef>
-          <a:effectRef idx="0">
-            <a:schemeClr val="accent1"/>
-          </a:effectRef>
-          <a:fontRef idx="minor">
-            <a:schemeClr val="tx1"/>
-          </a:fontRef>
-        </p:style>
-      </p:cxnSp>
-      <p:grpSp>
-        <p:nvGrpSpPr>
-          <p:cNvPr id="61" name="Group 60">
-            <a:extLst>
-              <a:ext uri="{FF2B5EF4-FFF2-40B4-BE49-F238E27FC236}">
-                <a16:creationId xmlns:a16="http://schemas.microsoft.com/office/drawing/2014/main" id="{46EA5BB3-2634-419B-ACF1-B8D3285C4B9E}"/>
-              </a:ext>
-            </a:extLst>
-          </p:cNvPr>
-          <p:cNvGrpSpPr/>
-          <p:nvPr/>
-        </p:nvGrpSpPr>
-        <p:grpSpPr>
-          <a:xfrm>
-            <a:off x="4159104" y="6182886"/>
-            <a:ext cx="967106" cy="612230"/>
-            <a:chOff x="4159104" y="6184098"/>
-            <a:chExt cx="967106" cy="612230"/>
-          </a:xfrm>
-        </p:grpSpPr>
-        <p:pic>
-          <p:nvPicPr>
-            <p:cNvPr id="30" name="Graphic 29">
-              <a:extLst>
-                <a:ext uri="{FF2B5EF4-FFF2-40B4-BE49-F238E27FC236}">
-                  <a16:creationId xmlns:a16="http://schemas.microsoft.com/office/drawing/2014/main" id="{D84DA98C-5DFE-40E2-8064-ABD79B552230}"/>
-                </a:ext>
-              </a:extLst>
-            </p:cNvPr>
-            <p:cNvPicPr>
-              <a:picLocks noChangeAspect="1"/>
-            </p:cNvPicPr>
-            <p:nvPr/>
-          </p:nvPicPr>
-          <p:blipFill>
-            <a:blip r:embed="rId28">
-              <a:extLst>
-                <a:ext uri="{28A0092B-C50C-407E-A947-70E740481C1C}">
-                  <a14:useLocalDpi xmlns:a14="http://schemas.microsoft.com/office/drawing/2010/main" val="0"/>
-                </a:ext>
-                <a:ext uri="{96DAC541-7B7A-43D3-8B79-37D633B846F1}">
-                  <asvg:svgBlip xmlns:asvg="http://schemas.microsoft.com/office/drawing/2016/SVG/main" r:embed="rId29"/>
-                </a:ext>
-              </a:extLst>
-            </a:blip>
-            <a:stretch>
-              <a:fillRect/>
-            </a:stretch>
-          </p:blipFill>
-          <p:spPr>
-            <a:xfrm>
-              <a:off x="4410449" y="6184098"/>
-              <a:ext cx="464416" cy="464416"/>
-            </a:xfrm>
-            <a:prstGeom prst="rect">
-              <a:avLst/>
-            </a:prstGeom>
-          </p:spPr>
-        </p:pic>
-        <p:sp>
-          <p:nvSpPr>
-            <p:cNvPr id="89" name="TextBox 88">
-              <a:extLst>
-                <a:ext uri="{FF2B5EF4-FFF2-40B4-BE49-F238E27FC236}">
-                  <a16:creationId xmlns:a16="http://schemas.microsoft.com/office/drawing/2014/main" id="{673476EF-17D5-4B62-B494-CBF9FD064295}"/>
-                </a:ext>
-              </a:extLst>
-            </p:cNvPr>
-            <p:cNvSpPr txBox="1"/>
-            <p:nvPr/>
-          </p:nvSpPr>
-          <p:spPr>
-            <a:xfrm>
-              <a:off x="4159104" y="6550107"/>
-              <a:ext cx="967106" cy="246221"/>
-            </a:xfrm>
-            <a:prstGeom prst="rect">
-              <a:avLst/>
-            </a:prstGeom>
-            <a:noFill/>
-          </p:spPr>
-          <p:txBody>
-            <a:bodyPr wrap="square" rtlCol="0">
-              <a:spAutoFit/>
-            </a:bodyPr>
-            <a:lstStyle/>
-            <a:p>
-              <a:pPr algn="ctr"/>
-              <a:r>
-                <a:rPr lang="en-US" sz="1000" dirty="0"/>
-                <a:t>CosmosDB</a:t>
-              </a:r>
-            </a:p>
-          </p:txBody>
-        </p:sp>
-      </p:grpSp>
-      <p:grpSp>
-        <p:nvGrpSpPr>
-          <p:cNvPr id="65" name="Group 64">
-            <a:extLst>
-              <a:ext uri="{FF2B5EF4-FFF2-40B4-BE49-F238E27FC236}">
-                <a16:creationId xmlns:a16="http://schemas.microsoft.com/office/drawing/2014/main" id="{FEC7ABA4-22CC-46A1-9056-4FA019F0F18C}"/>
-              </a:ext>
-            </a:extLst>
-          </p:cNvPr>
-          <p:cNvGrpSpPr/>
-          <p:nvPr/>
-        </p:nvGrpSpPr>
-        <p:grpSpPr>
-          <a:xfrm>
-            <a:off x="4839084" y="6182637"/>
-            <a:ext cx="967106" cy="581931"/>
-            <a:chOff x="4834631" y="6182637"/>
-            <a:chExt cx="967106" cy="581931"/>
-          </a:xfrm>
-        </p:grpSpPr>
-        <p:pic>
-          <p:nvPicPr>
-            <p:cNvPr id="56" name="Graphic 55">
-              <a:extLst>
-                <a:ext uri="{FF2B5EF4-FFF2-40B4-BE49-F238E27FC236}">
-                  <a16:creationId xmlns:a16="http://schemas.microsoft.com/office/drawing/2014/main" id="{A4657D8D-D698-423C-92F4-DE73AC32EE88}"/>
-                </a:ext>
-              </a:extLst>
-            </p:cNvPr>
-            <p:cNvPicPr>
-              <a:picLocks noChangeAspect="1"/>
-            </p:cNvPicPr>
-            <p:nvPr/>
-          </p:nvPicPr>
-          <p:blipFill>
-            <a:blip r:embed="rId30">
-              <a:extLst>
-                <a:ext uri="{28A0092B-C50C-407E-A947-70E740481C1C}">
-                  <a14:useLocalDpi xmlns:a14="http://schemas.microsoft.com/office/drawing/2010/main" val="0"/>
-                </a:ext>
-                <a:ext uri="{96DAC541-7B7A-43D3-8B79-37D633B846F1}">
-                  <asvg:svgBlip xmlns:asvg="http://schemas.microsoft.com/office/drawing/2016/SVG/main" r:embed="rId31"/>
-                </a:ext>
-              </a:extLst>
-            </a:blip>
-            <a:stretch>
-              <a:fillRect/>
-            </a:stretch>
-          </p:blipFill>
-          <p:spPr>
-            <a:xfrm>
-              <a:off x="5117992" y="6182637"/>
-              <a:ext cx="371491" cy="371491"/>
-            </a:xfrm>
-            <a:prstGeom prst="rect">
-              <a:avLst/>
-            </a:prstGeom>
-          </p:spPr>
-        </p:pic>
-        <p:sp>
-          <p:nvSpPr>
-            <p:cNvPr id="91" name="TextBox 90">
-              <a:extLst>
-                <a:ext uri="{FF2B5EF4-FFF2-40B4-BE49-F238E27FC236}">
-                  <a16:creationId xmlns:a16="http://schemas.microsoft.com/office/drawing/2014/main" id="{594A9A13-2BA6-4E3E-80C3-EE1DE2CD231D}"/>
-                </a:ext>
-              </a:extLst>
-            </p:cNvPr>
-            <p:cNvSpPr txBox="1"/>
-            <p:nvPr/>
-          </p:nvSpPr>
-          <p:spPr>
-            <a:xfrm>
-              <a:off x="4834631" y="6518347"/>
-              <a:ext cx="967106" cy="246221"/>
-            </a:xfrm>
-            <a:prstGeom prst="rect">
-              <a:avLst/>
-            </a:prstGeom>
-            <a:noFill/>
-          </p:spPr>
-          <p:txBody>
-            <a:bodyPr wrap="square" rtlCol="0">
-              <a:spAutoFit/>
-            </a:bodyPr>
-            <a:lstStyle/>
-            <a:p>
-              <a:pPr algn="ctr"/>
-              <a:r>
-                <a:rPr lang="en-US" sz="1000" dirty="0"/>
-                <a:t>KeyVault</a:t>
-              </a:r>
-            </a:p>
-          </p:txBody>
-        </p:sp>
-      </p:grpSp>
-      <p:grpSp>
-        <p:nvGrpSpPr>
-          <p:cNvPr id="92" name="Group 91">
-            <a:extLst>
-              <a:ext uri="{FF2B5EF4-FFF2-40B4-BE49-F238E27FC236}">
-                <a16:creationId xmlns:a16="http://schemas.microsoft.com/office/drawing/2014/main" id="{E62D6D58-DD12-40F4-91F7-ADBD431920EE}"/>
-              </a:ext>
-            </a:extLst>
-          </p:cNvPr>
-          <p:cNvGrpSpPr/>
-          <p:nvPr/>
-        </p:nvGrpSpPr>
-        <p:grpSpPr>
-          <a:xfrm>
-            <a:off x="6997862" y="3556069"/>
-            <a:ext cx="967106" cy="784999"/>
-            <a:chOff x="7024664" y="3607940"/>
-            <a:chExt cx="967106" cy="784999"/>
-          </a:xfrm>
-        </p:grpSpPr>
-        <p:pic>
-          <p:nvPicPr>
-            <p:cNvPr id="88" name="Graphic 87">
-              <a:extLst>
-                <a:ext uri="{FF2B5EF4-FFF2-40B4-BE49-F238E27FC236}">
-                  <a16:creationId xmlns:a16="http://schemas.microsoft.com/office/drawing/2014/main" id="{AA2EE23F-0BF1-4B89-B44B-1BBB5B530D0E}"/>
-                </a:ext>
-              </a:extLst>
-            </p:cNvPr>
-            <p:cNvPicPr>
-              <a:picLocks noChangeAspect="1"/>
-            </p:cNvPicPr>
-            <p:nvPr/>
-          </p:nvPicPr>
-          <p:blipFill>
-            <a:blip r:embed="rId32">
-              <a:extLst>
-                <a:ext uri="{28A0092B-C50C-407E-A947-70E740481C1C}">
-                  <a14:useLocalDpi xmlns:a14="http://schemas.microsoft.com/office/drawing/2010/main" val="0"/>
-                </a:ext>
-                <a:ext uri="{96DAC541-7B7A-43D3-8B79-37D633B846F1}">
-                  <asvg:svgBlip xmlns:asvg="http://schemas.microsoft.com/office/drawing/2016/SVG/main" r:embed="rId33"/>
-                </a:ext>
-              </a:extLst>
-            </a:blip>
-            <a:stretch>
-              <a:fillRect/>
-            </a:stretch>
-          </p:blipFill>
-          <p:spPr>
-            <a:xfrm>
-              <a:off x="7276010" y="3607940"/>
-              <a:ext cx="464414" cy="464414"/>
-            </a:xfrm>
-            <a:prstGeom prst="rect">
-              <a:avLst/>
-            </a:prstGeom>
-          </p:spPr>
-        </p:pic>
-        <p:sp>
-          <p:nvSpPr>
-            <p:cNvPr id="99" name="TextBox 98">
-              <a:extLst>
-                <a:ext uri="{FF2B5EF4-FFF2-40B4-BE49-F238E27FC236}">
-                  <a16:creationId xmlns:a16="http://schemas.microsoft.com/office/drawing/2014/main" id="{506E47ED-284C-45AD-BCBA-0F07A155BA0D}"/>
-                </a:ext>
-              </a:extLst>
-            </p:cNvPr>
-            <p:cNvSpPr txBox="1"/>
-            <p:nvPr/>
-          </p:nvSpPr>
-          <p:spPr>
-            <a:xfrm>
-              <a:off x="7024664" y="3992829"/>
-              <a:ext cx="967106" cy="400110"/>
-            </a:xfrm>
-            <a:prstGeom prst="rect">
-              <a:avLst/>
-            </a:prstGeom>
-            <a:noFill/>
-          </p:spPr>
-          <p:txBody>
-            <a:bodyPr wrap="square" rtlCol="0">
-              <a:spAutoFit/>
-            </a:bodyPr>
-            <a:lstStyle/>
-            <a:p>
-              <a:pPr algn="ctr"/>
-              <a:r>
-                <a:rPr lang="en-US" sz="1000" dirty="0"/>
-                <a:t>Public IP</a:t>
-              </a:r>
-            </a:p>
-            <a:p>
-              <a:pPr algn="ctr"/>
-              <a:r>
-                <a:rPr lang="en-US" sz="1000" dirty="0"/>
-                <a:t>Prefix</a:t>
-              </a:r>
-            </a:p>
-          </p:txBody>
-        </p:sp>
-      </p:grpSp>
-      <p:grpSp>
-        <p:nvGrpSpPr>
-          <p:cNvPr id="101" name="Group 100">
-            <a:extLst>
-              <a:ext uri="{FF2B5EF4-FFF2-40B4-BE49-F238E27FC236}">
-                <a16:creationId xmlns:a16="http://schemas.microsoft.com/office/drawing/2014/main" id="{8D7958F0-AF95-4DEA-B6A7-DC557C6DCA2C}"/>
-              </a:ext>
-            </a:extLst>
-          </p:cNvPr>
-          <p:cNvGrpSpPr/>
-          <p:nvPr/>
-        </p:nvGrpSpPr>
-        <p:grpSpPr>
-          <a:xfrm>
-            <a:off x="4182077" y="1124683"/>
-            <a:ext cx="701101" cy="528576"/>
-            <a:chOff x="5823976" y="5580210"/>
-            <a:chExt cx="701101" cy="528576"/>
-          </a:xfrm>
-        </p:grpSpPr>
-        <p:sp>
-          <p:nvSpPr>
-            <p:cNvPr id="102" name="TextBox 101">
-              <a:extLst>
-                <a:ext uri="{FF2B5EF4-FFF2-40B4-BE49-F238E27FC236}">
-                  <a16:creationId xmlns:a16="http://schemas.microsoft.com/office/drawing/2014/main" id="{9B83DA89-F3EC-4CB7-9620-5D32749C8364}"/>
-                </a:ext>
-              </a:extLst>
-            </p:cNvPr>
-            <p:cNvSpPr txBox="1"/>
-            <p:nvPr/>
-          </p:nvSpPr>
-          <p:spPr>
-            <a:xfrm>
-              <a:off x="5823976" y="5862565"/>
-              <a:ext cx="701101" cy="246221"/>
-            </a:xfrm>
-            <a:prstGeom prst="rect">
-              <a:avLst/>
-            </a:prstGeom>
-            <a:noFill/>
-          </p:spPr>
-          <p:txBody>
-            <a:bodyPr wrap="square" rtlCol="0">
-              <a:spAutoFit/>
-            </a:bodyPr>
-            <a:lstStyle/>
-            <a:p>
-              <a:pPr algn="ctr"/>
-              <a:r>
-                <a:rPr lang="en-US" sz="1000" dirty="0"/>
-                <a:t>Public IP</a:t>
-              </a:r>
-            </a:p>
-          </p:txBody>
-        </p:sp>
-        <p:pic>
-          <p:nvPicPr>
-            <p:cNvPr id="103" name="Graphic 102">
-              <a:extLst>
-                <a:ext uri="{FF2B5EF4-FFF2-40B4-BE49-F238E27FC236}">
-                  <a16:creationId xmlns:a16="http://schemas.microsoft.com/office/drawing/2014/main" id="{617996B8-E1B2-4929-9ABA-4ADFB286A999}"/>
-                </a:ext>
-              </a:extLst>
-            </p:cNvPr>
-            <p:cNvPicPr>
-              <a:picLocks noChangeAspect="1"/>
-            </p:cNvPicPr>
-            <p:nvPr/>
-          </p:nvPicPr>
-          <p:blipFill>
-            <a:blip r:embed="rId26">
-              <a:extLst>
-                <a:ext uri="{28A0092B-C50C-407E-A947-70E740481C1C}">
-                  <a14:useLocalDpi xmlns:a14="http://schemas.microsoft.com/office/drawing/2010/main" val="0"/>
-                </a:ext>
-                <a:ext uri="{96DAC541-7B7A-43D3-8B79-37D633B846F1}">
-                  <asvg:svgBlip xmlns:asvg="http://schemas.microsoft.com/office/drawing/2016/SVG/main" r:embed="rId27"/>
-                </a:ext>
-              </a:extLst>
-            </a:blip>
-            <a:stretch>
-              <a:fillRect/>
-            </a:stretch>
-          </p:blipFill>
-          <p:spPr>
-            <a:xfrm>
-              <a:off x="5989504" y="5580210"/>
-              <a:ext cx="371492" cy="371492"/>
-            </a:xfrm>
-            <a:prstGeom prst="rect">
-              <a:avLst/>
-            </a:prstGeom>
-          </p:spPr>
-        </p:pic>
-      </p:grpSp>
-      <p:cxnSp>
-        <p:nvCxnSpPr>
-          <p:cNvPr id="105" name="Connector: Elbow 104">
-            <a:extLst>
-              <a:ext uri="{FF2B5EF4-FFF2-40B4-BE49-F238E27FC236}">
-                <a16:creationId xmlns:a16="http://schemas.microsoft.com/office/drawing/2014/main" id="{EA350925-1A54-4EF8-9EF0-3B4AD2D5AE05}"/>
-              </a:ext>
-            </a:extLst>
-          </p:cNvPr>
-          <p:cNvCxnSpPr>
-            <a:stCxn id="103" idx="2"/>
-            <a:endCxn id="23" idx="0"/>
-          </p:cNvCxnSpPr>
-          <p:nvPr/>
-        </p:nvCxnSpPr>
-        <p:spPr>
-          <a:xfrm rot="5400000">
-            <a:off x="4299028" y="1713348"/>
-            <a:ext cx="451496" cy="17150"/>
-          </a:xfrm>
-          <a:prstGeom prst="bentConnector3">
-            <a:avLst/>
-          </a:prstGeom>
-          <a:ln>
-            <a:tailEnd type="triangle"/>
-          </a:ln>
-        </p:spPr>
-        <p:style>
-          <a:lnRef idx="1">
-            <a:schemeClr val="accent1"/>
-          </a:lnRef>
-          <a:fillRef idx="0">
-            <a:schemeClr val="accent1"/>
-          </a:fillRef>
-          <a:effectRef idx="0">
-            <a:schemeClr val="accent1"/>
-          </a:effectRef>
-          <a:fontRef idx="minor">
-            <a:schemeClr val="tx1"/>
-          </a:fontRef>
-        </p:style>
-      </p:cxnSp>
-    </p:spTree>
-    <p:extLst>
-      <p:ext uri="{BB962C8B-B14F-4D97-AF65-F5344CB8AC3E}">
-        <p14:creationId xmlns:p14="http://schemas.microsoft.com/office/powerpoint/2010/main" val="2135504599"/>
-      </p:ext>
-    </p:extLst>
-  </p:cSld>
-  <p:clrMapOvr>
-    <a:masterClrMapping/>
-  </p:clrMapOvr>
-</p:sld>
-</file>
-
-<file path=ppt/slides/slide8.xml><?xml version="1.0" encoding="utf-8"?>
 <p:sld xmlns:a="http://schemas.openxmlformats.org/drawingml/2006/main" xmlns:r="http://schemas.openxmlformats.org/officeDocument/2006/relationships" xmlns:p="http://schemas.openxmlformats.org/presentationml/2006/main">
   <p:cSld>
     <p:spTree>
@@ -13312,6 +10634,1683 @@
       </p:par>
     </p:tnLst>
   </p:timing>
+</p:sld>
+</file>
+
+<file path=ppt/slides/slide8.xml><?xml version="1.0" encoding="utf-8"?>
+<p:sld xmlns:a="http://schemas.openxmlformats.org/drawingml/2006/main" xmlns:r="http://schemas.openxmlformats.org/officeDocument/2006/relationships" xmlns:p="http://schemas.openxmlformats.org/presentationml/2006/main">
+  <p:cSld>
+    <p:spTree>
+      <p:nvGrpSpPr>
+        <p:cNvPr id="1" name=""/>
+        <p:cNvGrpSpPr/>
+        <p:nvPr/>
+      </p:nvGrpSpPr>
+      <p:grpSpPr>
+        <a:xfrm>
+          <a:off x="0" y="0"/>
+          <a:ext cx="0" cy="0"/>
+          <a:chOff x="0" y="0"/>
+          <a:chExt cx="0" cy="0"/>
+        </a:xfrm>
+      </p:grpSpPr>
+      <p:sp>
+        <p:nvSpPr>
+          <p:cNvPr id="2" name="Title 1">
+            <a:extLst>
+              <a:ext uri="{FF2B5EF4-FFF2-40B4-BE49-F238E27FC236}">
+                <a16:creationId xmlns:a16="http://schemas.microsoft.com/office/drawing/2014/main" id="{AF708F16-5DBC-4B6A-8DFC-6213EECAA9C2}"/>
+              </a:ext>
+            </a:extLst>
+          </p:cNvPr>
+          <p:cNvSpPr>
+            <a:spLocks noGrp="1"/>
+          </p:cNvSpPr>
+          <p:nvPr>
+            <p:ph type="title"/>
+          </p:nvPr>
+        </p:nvSpPr>
+        <p:spPr>
+          <a:xfrm>
+            <a:off x="415600" y="349240"/>
+            <a:ext cx="11360800" cy="763600"/>
+          </a:xfrm>
+        </p:spPr>
+        <p:txBody>
+          <a:bodyPr/>
+          <a:lstStyle/>
+          <a:p>
+            <a:r>
+              <a:rPr lang="en-US" dirty="0"/>
+              <a:t>Infrastructure</a:t>
+            </a:r>
+          </a:p>
+        </p:txBody>
+      </p:sp>
+      <p:pic>
+        <p:nvPicPr>
+          <p:cNvPr id="4" name="Google Shape;56;p13">
+            <a:extLst>
+              <a:ext uri="{FF2B5EF4-FFF2-40B4-BE49-F238E27FC236}">
+                <a16:creationId xmlns:a16="http://schemas.microsoft.com/office/drawing/2014/main" id="{5DC2FED0-7C5F-460C-998D-2520FD324176}"/>
+              </a:ext>
+            </a:extLst>
+          </p:cNvPr>
+          <p:cNvPicPr preferRelativeResize="0"/>
+          <p:nvPr/>
+        </p:nvPicPr>
+        <p:blipFill>
+          <a:blip r:embed="rId3">
+            <a:alphaModFix/>
+          </a:blip>
+          <a:stretch>
+            <a:fillRect/>
+          </a:stretch>
+        </p:blipFill>
+        <p:spPr>
+          <a:xfrm>
+            <a:off x="10989179" y="5736492"/>
+            <a:ext cx="1202821" cy="1121508"/>
+          </a:xfrm>
+          <a:prstGeom prst="rect">
+            <a:avLst/>
+          </a:prstGeom>
+          <a:noFill/>
+          <a:ln>
+            <a:noFill/>
+          </a:ln>
+        </p:spPr>
+      </p:pic>
+      <p:pic>
+        <p:nvPicPr>
+          <p:cNvPr id="6" name="Picture 5">
+            <a:extLst>
+              <a:ext uri="{FF2B5EF4-FFF2-40B4-BE49-F238E27FC236}">
+                <a16:creationId xmlns:a16="http://schemas.microsoft.com/office/drawing/2014/main" id="{562789FC-24E6-41E1-B839-308F71066FC1}"/>
+              </a:ext>
+            </a:extLst>
+          </p:cNvPr>
+          <p:cNvPicPr>
+            <a:picLocks noChangeAspect="1"/>
+          </p:cNvPicPr>
+          <p:nvPr/>
+        </p:nvPicPr>
+        <p:blipFill>
+          <a:blip r:embed="rId4"/>
+          <a:stretch>
+            <a:fillRect/>
+          </a:stretch>
+        </p:blipFill>
+        <p:spPr>
+          <a:xfrm>
+            <a:off x="10765535" y="469734"/>
+            <a:ext cx="1010865" cy="1010865"/>
+          </a:xfrm>
+          <a:prstGeom prst="rect">
+            <a:avLst/>
+          </a:prstGeom>
+        </p:spPr>
+      </p:pic>
+      <p:grpSp>
+        <p:nvGrpSpPr>
+          <p:cNvPr id="19" name="Group 18">
+            <a:extLst>
+              <a:ext uri="{FF2B5EF4-FFF2-40B4-BE49-F238E27FC236}">
+                <a16:creationId xmlns:a16="http://schemas.microsoft.com/office/drawing/2014/main" id="{775D5DFD-07C9-4C1E-8835-56220B091075}"/>
+              </a:ext>
+            </a:extLst>
+          </p:cNvPr>
+          <p:cNvGrpSpPr/>
+          <p:nvPr/>
+        </p:nvGrpSpPr>
+        <p:grpSpPr>
+          <a:xfrm>
+            <a:off x="2220082" y="2987409"/>
+            <a:ext cx="447451" cy="1814111"/>
+            <a:chOff x="2220082" y="2987409"/>
+            <a:chExt cx="447451" cy="1814111"/>
+          </a:xfrm>
+        </p:grpSpPr>
+        <p:sp>
+          <p:nvSpPr>
+            <p:cNvPr id="90" name="TextBox 89">
+              <a:extLst>
+                <a:ext uri="{FF2B5EF4-FFF2-40B4-BE49-F238E27FC236}">
+                  <a16:creationId xmlns:a16="http://schemas.microsoft.com/office/drawing/2014/main" id="{BE6F5629-6E61-4286-8A58-FA42169508C9}"/>
+                </a:ext>
+              </a:extLst>
+            </p:cNvPr>
+            <p:cNvSpPr txBox="1"/>
+            <p:nvPr/>
+          </p:nvSpPr>
+          <p:spPr>
+            <a:xfrm rot="16200000">
+              <a:off x="1758330" y="3490192"/>
+              <a:ext cx="1169726" cy="246221"/>
+            </a:xfrm>
+            <a:prstGeom prst="rect">
+              <a:avLst/>
+            </a:prstGeom>
+            <a:noFill/>
+          </p:spPr>
+          <p:txBody>
+            <a:bodyPr wrap="square" rtlCol="0">
+              <a:spAutoFit/>
+            </a:bodyPr>
+            <a:lstStyle/>
+            <a:p>
+              <a:r>
+                <a:rPr lang="en-US" sz="1000" dirty="0"/>
+                <a:t>VNet peering</a:t>
+              </a:r>
+            </a:p>
+          </p:txBody>
+        </p:sp>
+        <p:cxnSp>
+          <p:nvCxnSpPr>
+            <p:cNvPr id="104" name="Connector: Elbow 103">
+              <a:extLst>
+                <a:ext uri="{FF2B5EF4-FFF2-40B4-BE49-F238E27FC236}">
+                  <a16:creationId xmlns:a16="http://schemas.microsoft.com/office/drawing/2014/main" id="{64222C99-BEDF-4E7E-A888-F99B3724DB78}"/>
+                </a:ext>
+              </a:extLst>
+            </p:cNvPr>
+            <p:cNvCxnSpPr>
+              <a:cxnSpLocks/>
+              <a:stCxn id="80" idx="1"/>
+              <a:endCxn id="84" idx="1"/>
+            </p:cNvCxnSpPr>
+            <p:nvPr/>
+          </p:nvCxnSpPr>
+          <p:spPr>
+            <a:xfrm rot="10800000" flipH="1">
+              <a:off x="2664069" y="2987409"/>
+              <a:ext cx="3464" cy="1814111"/>
+            </a:xfrm>
+            <a:prstGeom prst="bentConnector3">
+              <a:avLst>
+                <a:gd name="adj1" fmla="val -6599307"/>
+              </a:avLst>
+            </a:prstGeom>
+          </p:spPr>
+          <p:style>
+            <a:lnRef idx="1">
+              <a:schemeClr val="accent1"/>
+            </a:lnRef>
+            <a:fillRef idx="0">
+              <a:schemeClr val="accent1"/>
+            </a:fillRef>
+            <a:effectRef idx="0">
+              <a:schemeClr val="accent1"/>
+            </a:effectRef>
+            <a:fontRef idx="minor">
+              <a:schemeClr val="tx1"/>
+            </a:fontRef>
+          </p:style>
+        </p:cxnSp>
+      </p:grpSp>
+      <p:grpSp>
+        <p:nvGrpSpPr>
+          <p:cNvPr id="10" name="Group 9">
+            <a:extLst>
+              <a:ext uri="{FF2B5EF4-FFF2-40B4-BE49-F238E27FC236}">
+                <a16:creationId xmlns:a16="http://schemas.microsoft.com/office/drawing/2014/main" id="{92855EB2-81BB-43C2-84C1-98AF02C28D6C}"/>
+              </a:ext>
+            </a:extLst>
+          </p:cNvPr>
+          <p:cNvGrpSpPr/>
+          <p:nvPr/>
+        </p:nvGrpSpPr>
+        <p:grpSpPr>
+          <a:xfrm>
+            <a:off x="2667533" y="2460213"/>
+            <a:ext cx="3930695" cy="1077768"/>
+            <a:chOff x="2667533" y="2460213"/>
+            <a:chExt cx="3930695" cy="1077768"/>
+          </a:xfrm>
+        </p:grpSpPr>
+        <p:grpSp>
+          <p:nvGrpSpPr>
+            <p:cNvPr id="5" name="Group 4">
+              <a:extLst>
+                <a:ext uri="{FF2B5EF4-FFF2-40B4-BE49-F238E27FC236}">
+                  <a16:creationId xmlns:a16="http://schemas.microsoft.com/office/drawing/2014/main" id="{A539E6F8-1035-4BAE-A592-F1D25CB1424A}"/>
+                </a:ext>
+              </a:extLst>
+            </p:cNvPr>
+            <p:cNvGrpSpPr/>
+            <p:nvPr/>
+          </p:nvGrpSpPr>
+          <p:grpSpPr>
+            <a:xfrm>
+              <a:off x="2697941" y="3286002"/>
+              <a:ext cx="1330851" cy="251979"/>
+              <a:chOff x="2697941" y="3286002"/>
+              <a:chExt cx="1330851" cy="251979"/>
+            </a:xfrm>
+          </p:grpSpPr>
+          <p:pic>
+            <p:nvPicPr>
+              <p:cNvPr id="85" name="Graphic 84">
+                <a:extLst>
+                  <a:ext uri="{FF2B5EF4-FFF2-40B4-BE49-F238E27FC236}">
+                    <a16:creationId xmlns:a16="http://schemas.microsoft.com/office/drawing/2014/main" id="{F42B162A-0AF5-4A4B-8B5B-CA2144BFA801}"/>
+                  </a:ext>
+                </a:extLst>
+              </p:cNvPr>
+              <p:cNvPicPr>
+                <a:picLocks noChangeAspect="1"/>
+              </p:cNvPicPr>
+              <p:nvPr/>
+            </p:nvPicPr>
+            <p:blipFill>
+              <a:blip r:embed="rId5">
+                <a:extLst>
+                  <a:ext uri="{28A0092B-C50C-407E-A947-70E740481C1C}">
+                    <a14:useLocalDpi xmlns:a14="http://schemas.microsoft.com/office/drawing/2010/main" val="0"/>
+                  </a:ext>
+                  <a:ext uri="{96DAC541-7B7A-43D3-8B79-37D633B846F1}">
+                    <asvg:svgBlip xmlns:asvg="http://schemas.microsoft.com/office/drawing/2016/SVG/main" r:embed="rId6"/>
+                  </a:ext>
+                </a:extLst>
+              </a:blip>
+              <a:stretch>
+                <a:fillRect/>
+              </a:stretch>
+            </p:blipFill>
+            <p:spPr>
+              <a:xfrm>
+                <a:off x="2697941" y="3286002"/>
+                <a:ext cx="251979" cy="251979"/>
+              </a:xfrm>
+              <a:prstGeom prst="rect">
+                <a:avLst/>
+              </a:prstGeom>
+            </p:spPr>
+          </p:pic>
+          <p:sp>
+            <p:nvSpPr>
+              <p:cNvPr id="86" name="TextBox 85">
+                <a:extLst>
+                  <a:ext uri="{FF2B5EF4-FFF2-40B4-BE49-F238E27FC236}">
+                    <a16:creationId xmlns:a16="http://schemas.microsoft.com/office/drawing/2014/main" id="{0D76ED6A-AF72-4363-9C6D-72205F9F3D63}"/>
+                  </a:ext>
+                </a:extLst>
+              </p:cNvPr>
+              <p:cNvSpPr txBox="1"/>
+              <p:nvPr/>
+            </p:nvSpPr>
+            <p:spPr>
+              <a:xfrm>
+                <a:off x="2905133" y="3288792"/>
+                <a:ext cx="1123659" cy="246221"/>
+              </a:xfrm>
+              <a:prstGeom prst="rect">
+                <a:avLst/>
+              </a:prstGeom>
+              <a:noFill/>
+            </p:spPr>
+            <p:txBody>
+              <a:bodyPr wrap="square" rtlCol="0">
+                <a:spAutoFit/>
+              </a:bodyPr>
+              <a:lstStyle/>
+              <a:p>
+                <a:r>
+                  <a:rPr lang="en-US" sz="1000" dirty="0"/>
+                  <a:t>iac-ws2-base-vnet</a:t>
+                </a:r>
+              </a:p>
+            </p:txBody>
+          </p:sp>
+        </p:grpSp>
+        <p:sp>
+          <p:nvSpPr>
+            <p:cNvPr id="84" name="Rectangle 83">
+              <a:extLst>
+                <a:ext uri="{FF2B5EF4-FFF2-40B4-BE49-F238E27FC236}">
+                  <a16:creationId xmlns:a16="http://schemas.microsoft.com/office/drawing/2014/main" id="{4BFF43BF-EF17-4EA8-BFF4-6C46DBD8EC95}"/>
+                </a:ext>
+              </a:extLst>
+            </p:cNvPr>
+            <p:cNvSpPr/>
+            <p:nvPr/>
+          </p:nvSpPr>
+          <p:spPr>
+            <a:xfrm>
+              <a:off x="2667533" y="2460213"/>
+              <a:ext cx="3930695" cy="1054389"/>
+            </a:xfrm>
+            <a:prstGeom prst="rect">
+              <a:avLst/>
+            </a:prstGeom>
+            <a:noFill/>
+            <a:ln>
+              <a:prstDash val="sysDash"/>
+            </a:ln>
+          </p:spPr>
+          <p:style>
+            <a:lnRef idx="2">
+              <a:schemeClr val="accent1">
+                <a:shade val="50000"/>
+              </a:schemeClr>
+            </a:lnRef>
+            <a:fillRef idx="1">
+              <a:schemeClr val="accent1"/>
+            </a:fillRef>
+            <a:effectRef idx="0">
+              <a:schemeClr val="accent1"/>
+            </a:effectRef>
+            <a:fontRef idx="minor">
+              <a:schemeClr val="lt1"/>
+            </a:fontRef>
+          </p:style>
+          <p:txBody>
+            <a:bodyPr rtlCol="0" anchor="ctr"/>
+            <a:lstStyle/>
+            <a:p>
+              <a:pPr algn="ctr"/>
+              <a:endParaRPr lang="en-US"/>
+            </a:p>
+          </p:txBody>
+        </p:sp>
+        <p:sp>
+          <p:nvSpPr>
+            <p:cNvPr id="73" name="Rectangle 72">
+              <a:extLst>
+                <a:ext uri="{FF2B5EF4-FFF2-40B4-BE49-F238E27FC236}">
+                  <a16:creationId xmlns:a16="http://schemas.microsoft.com/office/drawing/2014/main" id="{8DABFB2F-B120-48F5-BF4B-8339C821B6D7}"/>
+                </a:ext>
+              </a:extLst>
+            </p:cNvPr>
+            <p:cNvSpPr/>
+            <p:nvPr/>
+          </p:nvSpPr>
+          <p:spPr>
+            <a:xfrm>
+              <a:off x="2842953" y="2557336"/>
+              <a:ext cx="3599411" cy="688056"/>
+            </a:xfrm>
+            <a:prstGeom prst="rect">
+              <a:avLst/>
+            </a:prstGeom>
+            <a:noFill/>
+            <a:ln>
+              <a:prstDash val="dash"/>
+            </a:ln>
+          </p:spPr>
+          <p:style>
+            <a:lnRef idx="2">
+              <a:schemeClr val="accent1">
+                <a:shade val="50000"/>
+              </a:schemeClr>
+            </a:lnRef>
+            <a:fillRef idx="1">
+              <a:schemeClr val="accent1"/>
+            </a:fillRef>
+            <a:effectRef idx="0">
+              <a:schemeClr val="accent1"/>
+            </a:effectRef>
+            <a:fontRef idx="minor">
+              <a:schemeClr val="lt1"/>
+            </a:fontRef>
+          </p:style>
+          <p:txBody>
+            <a:bodyPr rtlCol="0" anchor="ctr"/>
+            <a:lstStyle/>
+            <a:p>
+              <a:pPr algn="ctr"/>
+              <a:endParaRPr lang="en-US"/>
+            </a:p>
+          </p:txBody>
+        </p:sp>
+        <p:sp>
+          <p:nvSpPr>
+            <p:cNvPr id="78" name="TextBox 77">
+              <a:extLst>
+                <a:ext uri="{FF2B5EF4-FFF2-40B4-BE49-F238E27FC236}">
+                  <a16:creationId xmlns:a16="http://schemas.microsoft.com/office/drawing/2014/main" id="{8660CB76-795A-4458-94C1-09B5E8CF4DA8}"/>
+                </a:ext>
+              </a:extLst>
+            </p:cNvPr>
+            <p:cNvSpPr txBox="1"/>
+            <p:nvPr/>
+          </p:nvSpPr>
+          <p:spPr>
+            <a:xfrm>
+              <a:off x="5526957" y="3047490"/>
+              <a:ext cx="967106" cy="246221"/>
+            </a:xfrm>
+            <a:prstGeom prst="rect">
+              <a:avLst/>
+            </a:prstGeom>
+            <a:noFill/>
+          </p:spPr>
+          <p:txBody>
+            <a:bodyPr wrap="square" rtlCol="0">
+              <a:spAutoFit/>
+            </a:bodyPr>
+            <a:lstStyle/>
+            <a:p>
+              <a:pPr algn="r"/>
+              <a:r>
+                <a:rPr lang="en-US" sz="1000" dirty="0"/>
+                <a:t>apim-net</a:t>
+              </a:r>
+            </a:p>
+          </p:txBody>
+        </p:sp>
+        <p:pic>
+          <p:nvPicPr>
+            <p:cNvPr id="75" name="Graphic 74">
+              <a:extLst>
+                <a:ext uri="{FF2B5EF4-FFF2-40B4-BE49-F238E27FC236}">
+                  <a16:creationId xmlns:a16="http://schemas.microsoft.com/office/drawing/2014/main" id="{D502F66E-19DF-470E-82F2-3090370EB01C}"/>
+                </a:ext>
+              </a:extLst>
+            </p:cNvPr>
+            <p:cNvPicPr>
+              <a:picLocks noChangeAspect="1"/>
+            </p:cNvPicPr>
+            <p:nvPr/>
+          </p:nvPicPr>
+          <p:blipFill>
+            <a:blip r:embed="rId7">
+              <a:extLst>
+                <a:ext uri="{28A0092B-C50C-407E-A947-70E740481C1C}">
+                  <a14:useLocalDpi xmlns:a14="http://schemas.microsoft.com/office/drawing/2010/main" val="0"/>
+                </a:ext>
+                <a:ext uri="{96DAC541-7B7A-43D3-8B79-37D633B846F1}">
+                  <asvg:svgBlip xmlns:asvg="http://schemas.microsoft.com/office/drawing/2016/SVG/main" r:embed="rId8"/>
+                </a:ext>
+              </a:extLst>
+            </a:blip>
+            <a:stretch>
+              <a:fillRect/>
+            </a:stretch>
+          </p:blipFill>
+          <p:spPr>
+            <a:xfrm>
+              <a:off x="6257040" y="2591688"/>
+              <a:ext cx="171450" cy="171450"/>
+            </a:xfrm>
+            <a:prstGeom prst="rect">
+              <a:avLst/>
+            </a:prstGeom>
+          </p:spPr>
+        </p:pic>
+      </p:grpSp>
+      <p:grpSp>
+        <p:nvGrpSpPr>
+          <p:cNvPr id="24" name="Group 23">
+            <a:extLst>
+              <a:ext uri="{FF2B5EF4-FFF2-40B4-BE49-F238E27FC236}">
+                <a16:creationId xmlns:a16="http://schemas.microsoft.com/office/drawing/2014/main" id="{E4D53730-E620-472D-9CB4-718107FC5A7C}"/>
+              </a:ext>
+            </a:extLst>
+          </p:cNvPr>
+          <p:cNvGrpSpPr/>
+          <p:nvPr/>
+        </p:nvGrpSpPr>
+        <p:grpSpPr>
+          <a:xfrm>
+            <a:off x="2664069" y="3676558"/>
+            <a:ext cx="3930695" cy="2411705"/>
+            <a:chOff x="2664069" y="3676558"/>
+            <a:chExt cx="3930695" cy="2411705"/>
+          </a:xfrm>
+        </p:grpSpPr>
+        <p:sp>
+          <p:nvSpPr>
+            <p:cNvPr id="80" name="Rectangle 79">
+              <a:extLst>
+                <a:ext uri="{FF2B5EF4-FFF2-40B4-BE49-F238E27FC236}">
+                  <a16:creationId xmlns:a16="http://schemas.microsoft.com/office/drawing/2014/main" id="{06D06C80-61AD-40AD-A254-90E26D89F9F3}"/>
+                </a:ext>
+              </a:extLst>
+            </p:cNvPr>
+            <p:cNvSpPr/>
+            <p:nvPr/>
+          </p:nvSpPr>
+          <p:spPr>
+            <a:xfrm>
+              <a:off x="2664069" y="3676558"/>
+              <a:ext cx="3930695" cy="2249922"/>
+            </a:xfrm>
+            <a:prstGeom prst="rect">
+              <a:avLst/>
+            </a:prstGeom>
+            <a:noFill/>
+            <a:ln>
+              <a:prstDash val="sysDash"/>
+            </a:ln>
+          </p:spPr>
+          <p:style>
+            <a:lnRef idx="2">
+              <a:schemeClr val="accent1">
+                <a:shade val="50000"/>
+              </a:schemeClr>
+            </a:lnRef>
+            <a:fillRef idx="1">
+              <a:schemeClr val="accent1"/>
+            </a:fillRef>
+            <a:effectRef idx="0">
+              <a:schemeClr val="accent1"/>
+            </a:effectRef>
+            <a:fontRef idx="minor">
+              <a:schemeClr val="lt1"/>
+            </a:fontRef>
+          </p:style>
+          <p:txBody>
+            <a:bodyPr rtlCol="0" anchor="ctr"/>
+            <a:lstStyle/>
+            <a:p>
+              <a:pPr algn="ctr"/>
+              <a:endParaRPr lang="en-US"/>
+            </a:p>
+          </p:txBody>
+        </p:sp>
+        <p:grpSp>
+          <p:nvGrpSpPr>
+            <p:cNvPr id="3" name="Group 2">
+              <a:extLst>
+                <a:ext uri="{FF2B5EF4-FFF2-40B4-BE49-F238E27FC236}">
+                  <a16:creationId xmlns:a16="http://schemas.microsoft.com/office/drawing/2014/main" id="{C7A33962-800E-4C6D-A77F-7F2A1D60AE3F}"/>
+                </a:ext>
+              </a:extLst>
+            </p:cNvPr>
+            <p:cNvGrpSpPr/>
+            <p:nvPr/>
+          </p:nvGrpSpPr>
+          <p:grpSpPr>
+            <a:xfrm>
+              <a:off x="2704578" y="5699014"/>
+              <a:ext cx="1613924" cy="252688"/>
+              <a:chOff x="2704578" y="5699014"/>
+              <a:chExt cx="1613924" cy="252688"/>
+            </a:xfrm>
+          </p:grpSpPr>
+          <p:pic>
+            <p:nvPicPr>
+              <p:cNvPr id="82" name="Graphic 81">
+                <a:extLst>
+                  <a:ext uri="{FF2B5EF4-FFF2-40B4-BE49-F238E27FC236}">
+                    <a16:creationId xmlns:a16="http://schemas.microsoft.com/office/drawing/2014/main" id="{711CAAFD-17C2-4C96-9613-FEB58B352AB3}"/>
+                  </a:ext>
+                </a:extLst>
+              </p:cNvPr>
+              <p:cNvPicPr>
+                <a:picLocks noChangeAspect="1"/>
+              </p:cNvPicPr>
+              <p:nvPr/>
+            </p:nvPicPr>
+            <p:blipFill>
+              <a:blip r:embed="rId5">
+                <a:extLst>
+                  <a:ext uri="{28A0092B-C50C-407E-A947-70E740481C1C}">
+                    <a14:useLocalDpi xmlns:a14="http://schemas.microsoft.com/office/drawing/2010/main" val="0"/>
+                  </a:ext>
+                  <a:ext uri="{96DAC541-7B7A-43D3-8B79-37D633B846F1}">
+                    <asvg:svgBlip xmlns:asvg="http://schemas.microsoft.com/office/drawing/2016/SVG/main" r:embed="rId6"/>
+                  </a:ext>
+                </a:extLst>
+              </a:blip>
+              <a:stretch>
+                <a:fillRect/>
+              </a:stretch>
+            </p:blipFill>
+            <p:spPr>
+              <a:xfrm>
+                <a:off x="2704578" y="5699723"/>
+                <a:ext cx="251979" cy="251979"/>
+              </a:xfrm>
+              <a:prstGeom prst="rect">
+                <a:avLst/>
+              </a:prstGeom>
+            </p:spPr>
+          </p:pic>
+          <p:sp>
+            <p:nvSpPr>
+              <p:cNvPr id="87" name="TextBox 86">
+                <a:extLst>
+                  <a:ext uri="{FF2B5EF4-FFF2-40B4-BE49-F238E27FC236}">
+                    <a16:creationId xmlns:a16="http://schemas.microsoft.com/office/drawing/2014/main" id="{01FF6855-8A3A-47DB-8567-4D615C557433}"/>
+                  </a:ext>
+                </a:extLst>
+              </p:cNvPr>
+              <p:cNvSpPr txBox="1"/>
+              <p:nvPr/>
+            </p:nvSpPr>
+            <p:spPr>
+              <a:xfrm>
+                <a:off x="2905133" y="5699014"/>
+                <a:ext cx="1413369" cy="246221"/>
+              </a:xfrm>
+              <a:prstGeom prst="rect">
+                <a:avLst/>
+              </a:prstGeom>
+              <a:noFill/>
+            </p:spPr>
+            <p:txBody>
+              <a:bodyPr wrap="square" rtlCol="0">
+                <a:spAutoFit/>
+              </a:bodyPr>
+              <a:lstStyle/>
+              <a:p>
+                <a:r>
+                  <a:rPr lang="en-US" sz="1000" dirty="0"/>
+                  <a:t>iac-ws2-aks-blue-vnet</a:t>
+                </a:r>
+              </a:p>
+            </p:txBody>
+          </p:sp>
+        </p:grpSp>
+        <p:sp>
+          <p:nvSpPr>
+            <p:cNvPr id="72" name="Rectangle 71">
+              <a:extLst>
+                <a:ext uri="{FF2B5EF4-FFF2-40B4-BE49-F238E27FC236}">
+                  <a16:creationId xmlns:a16="http://schemas.microsoft.com/office/drawing/2014/main" id="{1145F759-F8D6-4D5C-A35D-FF3BD13F3B91}"/>
+                </a:ext>
+              </a:extLst>
+            </p:cNvPr>
+            <p:cNvSpPr/>
+            <p:nvPr/>
+          </p:nvSpPr>
+          <p:spPr>
+            <a:xfrm>
+              <a:off x="2842953" y="3746482"/>
+              <a:ext cx="3599411" cy="1906285"/>
+            </a:xfrm>
+            <a:prstGeom prst="rect">
+              <a:avLst/>
+            </a:prstGeom>
+            <a:noFill/>
+            <a:ln>
+              <a:prstDash val="dash"/>
+            </a:ln>
+          </p:spPr>
+          <p:style>
+            <a:lnRef idx="2">
+              <a:schemeClr val="accent1">
+                <a:shade val="50000"/>
+              </a:schemeClr>
+            </a:lnRef>
+            <a:fillRef idx="1">
+              <a:schemeClr val="accent1"/>
+            </a:fillRef>
+            <a:effectRef idx="0">
+              <a:schemeClr val="accent1"/>
+            </a:effectRef>
+            <a:fontRef idx="minor">
+              <a:schemeClr val="lt1"/>
+            </a:fontRef>
+          </p:style>
+          <p:txBody>
+            <a:bodyPr rtlCol="0" anchor="ctr"/>
+            <a:lstStyle/>
+            <a:p>
+              <a:pPr algn="ctr"/>
+              <a:endParaRPr lang="en-US"/>
+            </a:p>
+          </p:txBody>
+        </p:sp>
+        <p:sp>
+          <p:nvSpPr>
+            <p:cNvPr id="79" name="TextBox 78">
+              <a:extLst>
+                <a:ext uri="{FF2B5EF4-FFF2-40B4-BE49-F238E27FC236}">
+                  <a16:creationId xmlns:a16="http://schemas.microsoft.com/office/drawing/2014/main" id="{E4A4BB18-6F49-4F94-9A73-D439AF5BC5E4}"/>
+                </a:ext>
+              </a:extLst>
+            </p:cNvPr>
+            <p:cNvSpPr txBox="1"/>
+            <p:nvPr/>
+          </p:nvSpPr>
+          <p:spPr>
+            <a:xfrm>
+              <a:off x="2783571" y="5453147"/>
+              <a:ext cx="967106" cy="246221"/>
+            </a:xfrm>
+            <a:prstGeom prst="rect">
+              <a:avLst/>
+            </a:prstGeom>
+            <a:noFill/>
+          </p:spPr>
+          <p:txBody>
+            <a:bodyPr wrap="square" rtlCol="0">
+              <a:spAutoFit/>
+            </a:bodyPr>
+            <a:lstStyle/>
+            <a:p>
+              <a:r>
+                <a:rPr lang="en-US" sz="1000" dirty="0"/>
+                <a:t>aks-net</a:t>
+              </a:r>
+            </a:p>
+          </p:txBody>
+        </p:sp>
+        <p:pic>
+          <p:nvPicPr>
+            <p:cNvPr id="35" name="Graphic 34">
+              <a:extLst>
+                <a:ext uri="{FF2B5EF4-FFF2-40B4-BE49-F238E27FC236}">
+                  <a16:creationId xmlns:a16="http://schemas.microsoft.com/office/drawing/2014/main" id="{AA8DFD16-8C4D-4636-894D-1D61EE64B8DA}"/>
+                </a:ext>
+              </a:extLst>
+            </p:cNvPr>
+            <p:cNvPicPr>
+              <a:picLocks noChangeAspect="1"/>
+            </p:cNvPicPr>
+            <p:nvPr/>
+          </p:nvPicPr>
+          <p:blipFill>
+            <a:blip r:embed="rId7">
+              <a:extLst>
+                <a:ext uri="{28A0092B-C50C-407E-A947-70E740481C1C}">
+                  <a14:useLocalDpi xmlns:a14="http://schemas.microsoft.com/office/drawing/2010/main" val="0"/>
+                </a:ext>
+                <a:ext uri="{96DAC541-7B7A-43D3-8B79-37D633B846F1}">
+                  <asvg:svgBlip xmlns:asvg="http://schemas.microsoft.com/office/drawing/2016/SVG/main" r:embed="rId8"/>
+                </a:ext>
+              </a:extLst>
+            </a:blip>
+            <a:stretch>
+              <a:fillRect/>
+            </a:stretch>
+          </p:blipFill>
+          <p:spPr>
+            <a:xfrm>
+              <a:off x="6255847" y="3777119"/>
+              <a:ext cx="171450" cy="171450"/>
+            </a:xfrm>
+            <a:prstGeom prst="rect">
+              <a:avLst/>
+            </a:prstGeom>
+          </p:spPr>
+        </p:pic>
+        <p:sp>
+          <p:nvSpPr>
+            <p:cNvPr id="94" name="Rectangle 93">
+              <a:extLst>
+                <a:ext uri="{FF2B5EF4-FFF2-40B4-BE49-F238E27FC236}">
+                  <a16:creationId xmlns:a16="http://schemas.microsoft.com/office/drawing/2014/main" id="{F4F1791A-87EE-4EB6-8CAC-E7715C8E60F3}"/>
+                </a:ext>
+              </a:extLst>
+            </p:cNvPr>
+            <p:cNvSpPr/>
+            <p:nvPr/>
+          </p:nvSpPr>
+          <p:spPr>
+            <a:xfrm>
+              <a:off x="3631223" y="5903601"/>
+              <a:ext cx="2044706" cy="184662"/>
+            </a:xfrm>
+            <a:prstGeom prst="rect">
+              <a:avLst/>
+            </a:prstGeom>
+            <a:solidFill>
+              <a:schemeClr val="accent4">
+                <a:lumMod val="20000"/>
+                <a:lumOff val="80000"/>
+              </a:schemeClr>
+            </a:solidFill>
+          </p:spPr>
+          <p:style>
+            <a:lnRef idx="2">
+              <a:schemeClr val="accent1">
+                <a:shade val="50000"/>
+              </a:schemeClr>
+            </a:lnRef>
+            <a:fillRef idx="1">
+              <a:schemeClr val="accent1"/>
+            </a:fillRef>
+            <a:effectRef idx="0">
+              <a:schemeClr val="accent1"/>
+            </a:effectRef>
+            <a:fontRef idx="minor">
+              <a:schemeClr val="lt1"/>
+            </a:fontRef>
+          </p:style>
+          <p:txBody>
+            <a:bodyPr rtlCol="0" anchor="ctr"/>
+            <a:lstStyle/>
+            <a:p>
+              <a:pPr algn="ctr"/>
+              <a:r>
+                <a:rPr lang="en-US" sz="1000" dirty="0">
+                  <a:solidFill>
+                    <a:schemeClr val="tx1"/>
+                  </a:solidFill>
+                </a:rPr>
+                <a:t>VNet Service Endpoints</a:t>
+              </a:r>
+            </a:p>
+          </p:txBody>
+        </p:sp>
+      </p:grpSp>
+    </p:spTree>
+    <p:extLst>
+      <p:ext uri="{BB962C8B-B14F-4D97-AF65-F5344CB8AC3E}">
+        <p14:creationId xmlns:p14="http://schemas.microsoft.com/office/powerpoint/2010/main" val="872098847"/>
+      </p:ext>
+    </p:extLst>
+  </p:cSld>
+  <p:clrMapOvr>
+    <a:masterClrMapping/>
+  </p:clrMapOvr>
+</p:sld>
+</file>
+
+<file path=ppt/slides/slide9.xml><?xml version="1.0" encoding="utf-8"?>
+<p:sld xmlns:a="http://schemas.openxmlformats.org/drawingml/2006/main" xmlns:r="http://schemas.openxmlformats.org/officeDocument/2006/relationships" xmlns:p="http://schemas.openxmlformats.org/presentationml/2006/main">
+  <p:cSld>
+    <p:spTree>
+      <p:nvGrpSpPr>
+        <p:cNvPr id="1" name=""/>
+        <p:cNvGrpSpPr/>
+        <p:nvPr/>
+      </p:nvGrpSpPr>
+      <p:grpSpPr>
+        <a:xfrm>
+          <a:off x="0" y="0"/>
+          <a:ext cx="0" cy="0"/>
+          <a:chOff x="0" y="0"/>
+          <a:chExt cx="0" cy="0"/>
+        </a:xfrm>
+      </p:grpSpPr>
+      <p:sp>
+        <p:nvSpPr>
+          <p:cNvPr id="2" name="Title 1">
+            <a:extLst>
+              <a:ext uri="{FF2B5EF4-FFF2-40B4-BE49-F238E27FC236}">
+                <a16:creationId xmlns:a16="http://schemas.microsoft.com/office/drawing/2014/main" id="{AF708F16-5DBC-4B6A-8DFC-6213EECAA9C2}"/>
+              </a:ext>
+            </a:extLst>
+          </p:cNvPr>
+          <p:cNvSpPr>
+            <a:spLocks noGrp="1"/>
+          </p:cNvSpPr>
+          <p:nvPr>
+            <p:ph type="title"/>
+          </p:nvPr>
+        </p:nvSpPr>
+        <p:spPr>
+          <a:xfrm>
+            <a:off x="415600" y="349240"/>
+            <a:ext cx="11360800" cy="763600"/>
+          </a:xfrm>
+        </p:spPr>
+        <p:txBody>
+          <a:bodyPr/>
+          <a:lstStyle/>
+          <a:p>
+            <a:r>
+              <a:rPr lang="en-US" dirty="0"/>
+              <a:t>Infrastructure</a:t>
+            </a:r>
+          </a:p>
+        </p:txBody>
+      </p:sp>
+      <p:pic>
+        <p:nvPicPr>
+          <p:cNvPr id="4" name="Google Shape;56;p13">
+            <a:extLst>
+              <a:ext uri="{FF2B5EF4-FFF2-40B4-BE49-F238E27FC236}">
+                <a16:creationId xmlns:a16="http://schemas.microsoft.com/office/drawing/2014/main" id="{5DC2FED0-7C5F-460C-998D-2520FD324176}"/>
+              </a:ext>
+            </a:extLst>
+          </p:cNvPr>
+          <p:cNvPicPr preferRelativeResize="0"/>
+          <p:nvPr/>
+        </p:nvPicPr>
+        <p:blipFill>
+          <a:blip r:embed="rId3">
+            <a:alphaModFix/>
+          </a:blip>
+          <a:stretch>
+            <a:fillRect/>
+          </a:stretch>
+        </p:blipFill>
+        <p:spPr>
+          <a:xfrm>
+            <a:off x="10989179" y="5736492"/>
+            <a:ext cx="1202821" cy="1121508"/>
+          </a:xfrm>
+          <a:prstGeom prst="rect">
+            <a:avLst/>
+          </a:prstGeom>
+          <a:noFill/>
+          <a:ln>
+            <a:noFill/>
+          </a:ln>
+        </p:spPr>
+      </p:pic>
+      <p:pic>
+        <p:nvPicPr>
+          <p:cNvPr id="6" name="Picture 5">
+            <a:extLst>
+              <a:ext uri="{FF2B5EF4-FFF2-40B4-BE49-F238E27FC236}">
+                <a16:creationId xmlns:a16="http://schemas.microsoft.com/office/drawing/2014/main" id="{562789FC-24E6-41E1-B839-308F71066FC1}"/>
+              </a:ext>
+            </a:extLst>
+          </p:cNvPr>
+          <p:cNvPicPr>
+            <a:picLocks noChangeAspect="1"/>
+          </p:cNvPicPr>
+          <p:nvPr/>
+        </p:nvPicPr>
+        <p:blipFill>
+          <a:blip r:embed="rId4"/>
+          <a:stretch>
+            <a:fillRect/>
+          </a:stretch>
+        </p:blipFill>
+        <p:spPr>
+          <a:xfrm>
+            <a:off x="10765535" y="469734"/>
+            <a:ext cx="1010865" cy="1010865"/>
+          </a:xfrm>
+          <a:prstGeom prst="rect">
+            <a:avLst/>
+          </a:prstGeom>
+        </p:spPr>
+      </p:pic>
+      <p:grpSp>
+        <p:nvGrpSpPr>
+          <p:cNvPr id="5" name="Group 4">
+            <a:extLst>
+              <a:ext uri="{FF2B5EF4-FFF2-40B4-BE49-F238E27FC236}">
+                <a16:creationId xmlns:a16="http://schemas.microsoft.com/office/drawing/2014/main" id="{A539E6F8-1035-4BAE-A592-F1D25CB1424A}"/>
+              </a:ext>
+            </a:extLst>
+          </p:cNvPr>
+          <p:cNvGrpSpPr/>
+          <p:nvPr/>
+        </p:nvGrpSpPr>
+        <p:grpSpPr>
+          <a:xfrm>
+            <a:off x="2697941" y="3286002"/>
+            <a:ext cx="1330851" cy="251979"/>
+            <a:chOff x="2697941" y="3286002"/>
+            <a:chExt cx="1330851" cy="251979"/>
+          </a:xfrm>
+        </p:grpSpPr>
+        <p:pic>
+          <p:nvPicPr>
+            <p:cNvPr id="85" name="Graphic 84">
+              <a:extLst>
+                <a:ext uri="{FF2B5EF4-FFF2-40B4-BE49-F238E27FC236}">
+                  <a16:creationId xmlns:a16="http://schemas.microsoft.com/office/drawing/2014/main" id="{F42B162A-0AF5-4A4B-8B5B-CA2144BFA801}"/>
+                </a:ext>
+              </a:extLst>
+            </p:cNvPr>
+            <p:cNvPicPr>
+              <a:picLocks noChangeAspect="1"/>
+            </p:cNvPicPr>
+            <p:nvPr/>
+          </p:nvPicPr>
+          <p:blipFill>
+            <a:blip r:embed="rId5">
+              <a:extLst>
+                <a:ext uri="{28A0092B-C50C-407E-A947-70E740481C1C}">
+                  <a14:useLocalDpi xmlns:a14="http://schemas.microsoft.com/office/drawing/2010/main" val="0"/>
+                </a:ext>
+                <a:ext uri="{96DAC541-7B7A-43D3-8B79-37D633B846F1}">
+                  <asvg:svgBlip xmlns:asvg="http://schemas.microsoft.com/office/drawing/2016/SVG/main" r:embed="rId6"/>
+                </a:ext>
+              </a:extLst>
+            </a:blip>
+            <a:stretch>
+              <a:fillRect/>
+            </a:stretch>
+          </p:blipFill>
+          <p:spPr>
+            <a:xfrm>
+              <a:off x="2697941" y="3286002"/>
+              <a:ext cx="251979" cy="251979"/>
+            </a:xfrm>
+            <a:prstGeom prst="rect">
+              <a:avLst/>
+            </a:prstGeom>
+          </p:spPr>
+        </p:pic>
+        <p:sp>
+          <p:nvSpPr>
+            <p:cNvPr id="86" name="TextBox 85">
+              <a:extLst>
+                <a:ext uri="{FF2B5EF4-FFF2-40B4-BE49-F238E27FC236}">
+                  <a16:creationId xmlns:a16="http://schemas.microsoft.com/office/drawing/2014/main" id="{0D76ED6A-AF72-4363-9C6D-72205F9F3D63}"/>
+                </a:ext>
+              </a:extLst>
+            </p:cNvPr>
+            <p:cNvSpPr txBox="1"/>
+            <p:nvPr/>
+          </p:nvSpPr>
+          <p:spPr>
+            <a:xfrm>
+              <a:off x="2905133" y="3288792"/>
+              <a:ext cx="1123659" cy="246221"/>
+            </a:xfrm>
+            <a:prstGeom prst="rect">
+              <a:avLst/>
+            </a:prstGeom>
+            <a:noFill/>
+          </p:spPr>
+          <p:txBody>
+            <a:bodyPr wrap="square" rtlCol="0">
+              <a:spAutoFit/>
+            </a:bodyPr>
+            <a:lstStyle/>
+            <a:p>
+              <a:r>
+                <a:rPr lang="en-US" sz="1000" dirty="0"/>
+                <a:t>iac-ws2-vnet</a:t>
+              </a:r>
+            </a:p>
+          </p:txBody>
+        </p:sp>
+      </p:grpSp>
+      <p:sp>
+        <p:nvSpPr>
+          <p:cNvPr id="84" name="Rectangle 83">
+            <a:extLst>
+              <a:ext uri="{FF2B5EF4-FFF2-40B4-BE49-F238E27FC236}">
+                <a16:creationId xmlns:a16="http://schemas.microsoft.com/office/drawing/2014/main" id="{4BFF43BF-EF17-4EA8-BFF4-6C46DBD8EC95}"/>
+              </a:ext>
+            </a:extLst>
+          </p:cNvPr>
+          <p:cNvSpPr/>
+          <p:nvPr/>
+        </p:nvSpPr>
+        <p:spPr>
+          <a:xfrm>
+            <a:off x="2667533" y="2460213"/>
+            <a:ext cx="3930695" cy="1054389"/>
+          </a:xfrm>
+          <a:prstGeom prst="rect">
+            <a:avLst/>
+          </a:prstGeom>
+          <a:noFill/>
+          <a:ln>
+            <a:prstDash val="sysDash"/>
+          </a:ln>
+        </p:spPr>
+        <p:style>
+          <a:lnRef idx="2">
+            <a:schemeClr val="accent1">
+              <a:shade val="50000"/>
+            </a:schemeClr>
+          </a:lnRef>
+          <a:fillRef idx="1">
+            <a:schemeClr val="accent1"/>
+          </a:fillRef>
+          <a:effectRef idx="0">
+            <a:schemeClr val="accent1"/>
+          </a:effectRef>
+          <a:fontRef idx="minor">
+            <a:schemeClr val="lt1"/>
+          </a:fontRef>
+        </p:style>
+        <p:txBody>
+          <a:bodyPr rtlCol="0" anchor="ctr"/>
+          <a:lstStyle/>
+          <a:p>
+            <a:pPr algn="ctr"/>
+            <a:endParaRPr lang="en-US"/>
+          </a:p>
+        </p:txBody>
+      </p:sp>
+      <p:sp>
+        <p:nvSpPr>
+          <p:cNvPr id="73" name="Rectangle 72">
+            <a:extLst>
+              <a:ext uri="{FF2B5EF4-FFF2-40B4-BE49-F238E27FC236}">
+                <a16:creationId xmlns:a16="http://schemas.microsoft.com/office/drawing/2014/main" id="{8DABFB2F-B120-48F5-BF4B-8339C821B6D7}"/>
+              </a:ext>
+            </a:extLst>
+          </p:cNvPr>
+          <p:cNvSpPr/>
+          <p:nvPr/>
+        </p:nvSpPr>
+        <p:spPr>
+          <a:xfrm>
+            <a:off x="2842953" y="2557336"/>
+            <a:ext cx="3599411" cy="688056"/>
+          </a:xfrm>
+          <a:prstGeom prst="rect">
+            <a:avLst/>
+          </a:prstGeom>
+          <a:noFill/>
+          <a:ln>
+            <a:prstDash val="dash"/>
+          </a:ln>
+        </p:spPr>
+        <p:style>
+          <a:lnRef idx="2">
+            <a:schemeClr val="accent1">
+              <a:shade val="50000"/>
+            </a:schemeClr>
+          </a:lnRef>
+          <a:fillRef idx="1">
+            <a:schemeClr val="accent1"/>
+          </a:fillRef>
+          <a:effectRef idx="0">
+            <a:schemeClr val="accent1"/>
+          </a:effectRef>
+          <a:fontRef idx="minor">
+            <a:schemeClr val="lt1"/>
+          </a:fontRef>
+        </p:style>
+        <p:txBody>
+          <a:bodyPr rtlCol="0" anchor="ctr"/>
+          <a:lstStyle/>
+          <a:p>
+            <a:pPr algn="ctr"/>
+            <a:endParaRPr lang="en-US"/>
+          </a:p>
+        </p:txBody>
+      </p:sp>
+      <p:sp>
+        <p:nvSpPr>
+          <p:cNvPr id="78" name="TextBox 77">
+            <a:extLst>
+              <a:ext uri="{FF2B5EF4-FFF2-40B4-BE49-F238E27FC236}">
+                <a16:creationId xmlns:a16="http://schemas.microsoft.com/office/drawing/2014/main" id="{8660CB76-795A-4458-94C1-09B5E8CF4DA8}"/>
+              </a:ext>
+            </a:extLst>
+          </p:cNvPr>
+          <p:cNvSpPr txBox="1"/>
+          <p:nvPr/>
+        </p:nvSpPr>
+        <p:spPr>
+          <a:xfrm>
+            <a:off x="5526957" y="3047490"/>
+            <a:ext cx="967106" cy="246221"/>
+          </a:xfrm>
+          <a:prstGeom prst="rect">
+            <a:avLst/>
+          </a:prstGeom>
+          <a:noFill/>
+        </p:spPr>
+        <p:txBody>
+          <a:bodyPr wrap="square" rtlCol="0">
+            <a:spAutoFit/>
+          </a:bodyPr>
+          <a:lstStyle/>
+          <a:p>
+            <a:pPr algn="r"/>
+            <a:r>
+              <a:rPr lang="en-US" sz="1000" dirty="0"/>
+              <a:t>apim-net</a:t>
+            </a:r>
+          </a:p>
+        </p:txBody>
+      </p:sp>
+      <p:pic>
+        <p:nvPicPr>
+          <p:cNvPr id="75" name="Graphic 74">
+            <a:extLst>
+              <a:ext uri="{FF2B5EF4-FFF2-40B4-BE49-F238E27FC236}">
+                <a16:creationId xmlns:a16="http://schemas.microsoft.com/office/drawing/2014/main" id="{D502F66E-19DF-470E-82F2-3090370EB01C}"/>
+              </a:ext>
+            </a:extLst>
+          </p:cNvPr>
+          <p:cNvPicPr>
+            <a:picLocks noChangeAspect="1"/>
+          </p:cNvPicPr>
+          <p:nvPr/>
+        </p:nvPicPr>
+        <p:blipFill>
+          <a:blip r:embed="rId7">
+            <a:extLst>
+              <a:ext uri="{28A0092B-C50C-407E-A947-70E740481C1C}">
+                <a14:useLocalDpi xmlns:a14="http://schemas.microsoft.com/office/drawing/2010/main" val="0"/>
+              </a:ext>
+              <a:ext uri="{96DAC541-7B7A-43D3-8B79-37D633B846F1}">
+                <asvg:svgBlip xmlns:asvg="http://schemas.microsoft.com/office/drawing/2016/SVG/main" r:embed="rId8"/>
+              </a:ext>
+            </a:extLst>
+          </a:blip>
+          <a:stretch>
+            <a:fillRect/>
+          </a:stretch>
+        </p:blipFill>
+        <p:spPr>
+          <a:xfrm>
+            <a:off x="6257040" y="2591688"/>
+            <a:ext cx="171450" cy="171450"/>
+          </a:xfrm>
+          <a:prstGeom prst="rect">
+            <a:avLst/>
+          </a:prstGeom>
+        </p:spPr>
+      </p:pic>
+      <p:grpSp>
+        <p:nvGrpSpPr>
+          <p:cNvPr id="32" name="Group 31">
+            <a:extLst>
+              <a:ext uri="{FF2B5EF4-FFF2-40B4-BE49-F238E27FC236}">
+                <a16:creationId xmlns:a16="http://schemas.microsoft.com/office/drawing/2014/main" id="{CA3548AA-1FEC-455B-A206-716DB5A1D236}"/>
+              </a:ext>
+            </a:extLst>
+          </p:cNvPr>
+          <p:cNvGrpSpPr/>
+          <p:nvPr/>
+        </p:nvGrpSpPr>
+        <p:grpSpPr>
+          <a:xfrm>
+            <a:off x="1416886" y="2628685"/>
+            <a:ext cx="1144865" cy="717444"/>
+            <a:chOff x="1125655" y="4731777"/>
+            <a:chExt cx="1144865" cy="717444"/>
+          </a:xfrm>
+        </p:grpSpPr>
+        <p:pic>
+          <p:nvPicPr>
+            <p:cNvPr id="33" name="Graphic 32">
+              <a:extLst>
+                <a:ext uri="{FF2B5EF4-FFF2-40B4-BE49-F238E27FC236}">
+                  <a16:creationId xmlns:a16="http://schemas.microsoft.com/office/drawing/2014/main" id="{07AB9493-6FF5-4273-9E15-0D0CED85D93B}"/>
+                </a:ext>
+              </a:extLst>
+            </p:cNvPr>
+            <p:cNvPicPr>
+              <a:picLocks noChangeAspect="1"/>
+            </p:cNvPicPr>
+            <p:nvPr/>
+          </p:nvPicPr>
+          <p:blipFill>
+            <a:blip r:embed="rId9">
+              <a:extLst>
+                <a:ext uri="{28A0092B-C50C-407E-A947-70E740481C1C}">
+                  <a14:useLocalDpi xmlns:a14="http://schemas.microsoft.com/office/drawing/2010/main" val="0"/>
+                </a:ext>
+                <a:ext uri="{96DAC541-7B7A-43D3-8B79-37D633B846F1}">
+                  <asvg:svgBlip xmlns:asvg="http://schemas.microsoft.com/office/drawing/2016/SVG/main" r:embed="rId10"/>
+                </a:ext>
+              </a:extLst>
+            </a:blip>
+            <a:stretch>
+              <a:fillRect/>
+            </a:stretch>
+          </p:blipFill>
+          <p:spPr>
+            <a:xfrm>
+              <a:off x="1465881" y="4731777"/>
+              <a:ext cx="464414" cy="464414"/>
+            </a:xfrm>
+            <a:prstGeom prst="rect">
+              <a:avLst/>
+            </a:prstGeom>
+          </p:spPr>
+        </p:pic>
+        <p:sp>
+          <p:nvSpPr>
+            <p:cNvPr id="34" name="TextBox 33">
+              <a:extLst>
+                <a:ext uri="{FF2B5EF4-FFF2-40B4-BE49-F238E27FC236}">
+                  <a16:creationId xmlns:a16="http://schemas.microsoft.com/office/drawing/2014/main" id="{F90444C5-3F52-4886-AFEA-5172BA0CFB69}"/>
+                </a:ext>
+              </a:extLst>
+            </p:cNvPr>
+            <p:cNvSpPr txBox="1"/>
+            <p:nvPr/>
+          </p:nvSpPr>
+          <p:spPr>
+            <a:xfrm>
+              <a:off x="1125655" y="5203000"/>
+              <a:ext cx="1144865" cy="246221"/>
+            </a:xfrm>
+            <a:prstGeom prst="rect">
+              <a:avLst/>
+            </a:prstGeom>
+            <a:noFill/>
+          </p:spPr>
+          <p:txBody>
+            <a:bodyPr wrap="none" rtlCol="0">
+              <a:spAutoFit/>
+            </a:bodyPr>
+            <a:lstStyle/>
+            <a:p>
+              <a:r>
+                <a:rPr lang="en-US" sz="1000" dirty="0"/>
+                <a:t>Container Registry</a:t>
+              </a:r>
+            </a:p>
+          </p:txBody>
+        </p:sp>
+      </p:grpSp>
+      <p:grpSp>
+        <p:nvGrpSpPr>
+          <p:cNvPr id="39" name="Group 38">
+            <a:extLst>
+              <a:ext uri="{FF2B5EF4-FFF2-40B4-BE49-F238E27FC236}">
+                <a16:creationId xmlns:a16="http://schemas.microsoft.com/office/drawing/2014/main" id="{E0460AF8-D4B8-4D8A-9BB6-787FAFCEFF9F}"/>
+              </a:ext>
+            </a:extLst>
+          </p:cNvPr>
+          <p:cNvGrpSpPr/>
+          <p:nvPr/>
+        </p:nvGrpSpPr>
+        <p:grpSpPr>
+          <a:xfrm>
+            <a:off x="7594227" y="2587471"/>
+            <a:ext cx="967106" cy="784999"/>
+            <a:chOff x="7024664" y="3607940"/>
+            <a:chExt cx="967106" cy="784999"/>
+          </a:xfrm>
+        </p:grpSpPr>
+        <p:pic>
+          <p:nvPicPr>
+            <p:cNvPr id="40" name="Graphic 39">
+              <a:extLst>
+                <a:ext uri="{FF2B5EF4-FFF2-40B4-BE49-F238E27FC236}">
+                  <a16:creationId xmlns:a16="http://schemas.microsoft.com/office/drawing/2014/main" id="{C1185322-14AA-4DE5-BF7D-0D0B00AD7138}"/>
+                </a:ext>
+              </a:extLst>
+            </p:cNvPr>
+            <p:cNvPicPr>
+              <a:picLocks noChangeAspect="1"/>
+            </p:cNvPicPr>
+            <p:nvPr/>
+          </p:nvPicPr>
+          <p:blipFill>
+            <a:blip r:embed="rId11">
+              <a:extLst>
+                <a:ext uri="{28A0092B-C50C-407E-A947-70E740481C1C}">
+                  <a14:useLocalDpi xmlns:a14="http://schemas.microsoft.com/office/drawing/2010/main" val="0"/>
+                </a:ext>
+                <a:ext uri="{96DAC541-7B7A-43D3-8B79-37D633B846F1}">
+                  <asvg:svgBlip xmlns:asvg="http://schemas.microsoft.com/office/drawing/2016/SVG/main" r:embed="rId12"/>
+                </a:ext>
+              </a:extLst>
+            </a:blip>
+            <a:stretch>
+              <a:fillRect/>
+            </a:stretch>
+          </p:blipFill>
+          <p:spPr>
+            <a:xfrm>
+              <a:off x="7276010" y="3607940"/>
+              <a:ext cx="464414" cy="464414"/>
+            </a:xfrm>
+            <a:prstGeom prst="rect">
+              <a:avLst/>
+            </a:prstGeom>
+          </p:spPr>
+        </p:pic>
+        <p:sp>
+          <p:nvSpPr>
+            <p:cNvPr id="41" name="TextBox 40">
+              <a:extLst>
+                <a:ext uri="{FF2B5EF4-FFF2-40B4-BE49-F238E27FC236}">
+                  <a16:creationId xmlns:a16="http://schemas.microsoft.com/office/drawing/2014/main" id="{D3FA9A3C-D035-40B8-AFC3-4B676D778AF6}"/>
+                </a:ext>
+              </a:extLst>
+            </p:cNvPr>
+            <p:cNvSpPr txBox="1"/>
+            <p:nvPr/>
+          </p:nvSpPr>
+          <p:spPr>
+            <a:xfrm>
+              <a:off x="7024664" y="3992829"/>
+              <a:ext cx="967106" cy="400110"/>
+            </a:xfrm>
+            <a:prstGeom prst="rect">
+              <a:avLst/>
+            </a:prstGeom>
+            <a:noFill/>
+          </p:spPr>
+          <p:txBody>
+            <a:bodyPr wrap="square" rtlCol="0">
+              <a:spAutoFit/>
+            </a:bodyPr>
+            <a:lstStyle/>
+            <a:p>
+              <a:pPr algn="ctr"/>
+              <a:r>
+                <a:rPr lang="en-US" sz="1000" dirty="0"/>
+                <a:t>Public IP</a:t>
+              </a:r>
+            </a:p>
+            <a:p>
+              <a:pPr algn="ctr"/>
+              <a:r>
+                <a:rPr lang="en-US" sz="1000" dirty="0"/>
+                <a:t>Prefix</a:t>
+              </a:r>
+            </a:p>
+          </p:txBody>
+        </p:sp>
+      </p:grpSp>
+      <p:sp>
+        <p:nvSpPr>
+          <p:cNvPr id="8" name="Rectangle 7">
+            <a:extLst>
+              <a:ext uri="{FF2B5EF4-FFF2-40B4-BE49-F238E27FC236}">
+                <a16:creationId xmlns:a16="http://schemas.microsoft.com/office/drawing/2014/main" id="{181298C4-C071-4271-8052-496A36C208CB}"/>
+              </a:ext>
+            </a:extLst>
+          </p:cNvPr>
+          <p:cNvSpPr/>
+          <p:nvPr/>
+        </p:nvSpPr>
+        <p:spPr>
+          <a:xfrm>
+            <a:off x="1204111" y="2263366"/>
+            <a:ext cx="7357222" cy="1403287"/>
+          </a:xfrm>
+          <a:prstGeom prst="rect">
+            <a:avLst/>
+          </a:prstGeom>
+          <a:noFill/>
+        </p:spPr>
+        <p:style>
+          <a:lnRef idx="2">
+            <a:schemeClr val="accent1">
+              <a:shade val="50000"/>
+            </a:schemeClr>
+          </a:lnRef>
+          <a:fillRef idx="1">
+            <a:schemeClr val="accent1"/>
+          </a:fillRef>
+          <a:effectRef idx="0">
+            <a:schemeClr val="accent1"/>
+          </a:effectRef>
+          <a:fontRef idx="minor">
+            <a:schemeClr val="lt1"/>
+          </a:fontRef>
+        </p:style>
+        <p:txBody>
+          <a:bodyPr rtlCol="0" anchor="ctr"/>
+          <a:lstStyle/>
+          <a:p>
+            <a:pPr algn="ctr"/>
+            <a:endParaRPr lang="en-US"/>
+          </a:p>
+        </p:txBody>
+      </p:sp>
+      <p:pic>
+        <p:nvPicPr>
+          <p:cNvPr id="11" name="Graphic 10">
+            <a:extLst>
+              <a:ext uri="{FF2B5EF4-FFF2-40B4-BE49-F238E27FC236}">
+                <a16:creationId xmlns:a16="http://schemas.microsoft.com/office/drawing/2014/main" id="{7000204C-22AC-4B40-85AA-927C478EE242}"/>
+              </a:ext>
+            </a:extLst>
+          </p:cNvPr>
+          <p:cNvPicPr>
+            <a:picLocks noChangeAspect="1"/>
+          </p:cNvPicPr>
+          <p:nvPr/>
+        </p:nvPicPr>
+        <p:blipFill>
+          <a:blip r:embed="rId13">
+            <a:extLst>
+              <a:ext uri="{28A0092B-C50C-407E-A947-70E740481C1C}">
+                <a14:useLocalDpi xmlns:a14="http://schemas.microsoft.com/office/drawing/2010/main" val="0"/>
+              </a:ext>
+              <a:ext uri="{96DAC541-7B7A-43D3-8B79-37D633B846F1}">
+                <asvg:svgBlip xmlns:asvg="http://schemas.microsoft.com/office/drawing/2016/SVG/main" r:embed="rId14"/>
+              </a:ext>
+            </a:extLst>
+          </a:blip>
+          <a:stretch>
+            <a:fillRect/>
+          </a:stretch>
+        </p:blipFill>
+        <p:spPr>
+          <a:xfrm>
+            <a:off x="1236793" y="2282763"/>
+            <a:ext cx="228803" cy="228803"/>
+          </a:xfrm>
+          <a:prstGeom prst="rect">
+            <a:avLst/>
+          </a:prstGeom>
+        </p:spPr>
+      </p:pic>
+      <p:sp>
+        <p:nvSpPr>
+          <p:cNvPr id="44" name="TextBox 43">
+            <a:extLst>
+              <a:ext uri="{FF2B5EF4-FFF2-40B4-BE49-F238E27FC236}">
+                <a16:creationId xmlns:a16="http://schemas.microsoft.com/office/drawing/2014/main" id="{7598C3EA-1FA3-4D34-827F-729D1C090DC7}"/>
+              </a:ext>
+            </a:extLst>
+          </p:cNvPr>
+          <p:cNvSpPr txBox="1"/>
+          <p:nvPr/>
+        </p:nvSpPr>
+        <p:spPr>
+          <a:xfrm>
+            <a:off x="1404086" y="2274055"/>
+            <a:ext cx="1123659" cy="246221"/>
+          </a:xfrm>
+          <a:prstGeom prst="rect">
+            <a:avLst/>
+          </a:prstGeom>
+          <a:noFill/>
+        </p:spPr>
+        <p:txBody>
+          <a:bodyPr wrap="square" rtlCol="0">
+            <a:spAutoFit/>
+          </a:bodyPr>
+          <a:lstStyle/>
+          <a:p>
+            <a:r>
+              <a:rPr lang="en-US" sz="1000" dirty="0"/>
+              <a:t>iac-ws2-base-rg</a:t>
+            </a:r>
+          </a:p>
+        </p:txBody>
+      </p:sp>
+      <p:grpSp>
+        <p:nvGrpSpPr>
+          <p:cNvPr id="14" name="Group 13">
+            <a:extLst>
+              <a:ext uri="{FF2B5EF4-FFF2-40B4-BE49-F238E27FC236}">
+                <a16:creationId xmlns:a16="http://schemas.microsoft.com/office/drawing/2014/main" id="{D814A492-F5D1-49AB-B90D-FE4ED11F18A7}"/>
+              </a:ext>
+            </a:extLst>
+          </p:cNvPr>
+          <p:cNvGrpSpPr/>
+          <p:nvPr/>
+        </p:nvGrpSpPr>
+        <p:grpSpPr>
+          <a:xfrm>
+            <a:off x="6722603" y="2609692"/>
+            <a:ext cx="967106" cy="710634"/>
+            <a:chOff x="7079732" y="4051542"/>
+            <a:chExt cx="967106" cy="710634"/>
+          </a:xfrm>
+        </p:grpSpPr>
+        <p:sp>
+          <p:nvSpPr>
+            <p:cNvPr id="38" name="TextBox 37">
+              <a:extLst>
+                <a:ext uri="{FF2B5EF4-FFF2-40B4-BE49-F238E27FC236}">
+                  <a16:creationId xmlns:a16="http://schemas.microsoft.com/office/drawing/2014/main" id="{196478A0-37EE-4715-BD01-729C7EF5BA55}"/>
+                </a:ext>
+              </a:extLst>
+            </p:cNvPr>
+            <p:cNvSpPr txBox="1"/>
+            <p:nvPr/>
+          </p:nvSpPr>
+          <p:spPr>
+            <a:xfrm>
+              <a:off x="7079732" y="4515955"/>
+              <a:ext cx="967106" cy="246221"/>
+            </a:xfrm>
+            <a:prstGeom prst="rect">
+              <a:avLst/>
+            </a:prstGeom>
+            <a:noFill/>
+          </p:spPr>
+          <p:txBody>
+            <a:bodyPr wrap="square" rtlCol="0">
+              <a:spAutoFit/>
+            </a:bodyPr>
+            <a:lstStyle/>
+            <a:p>
+              <a:pPr algn="ctr"/>
+              <a:r>
+                <a:rPr lang="en-US" sz="1000" dirty="0"/>
+                <a:t>Log Analytics</a:t>
+              </a:r>
+            </a:p>
+          </p:txBody>
+        </p:sp>
+        <p:pic>
+          <p:nvPicPr>
+            <p:cNvPr id="13" name="Graphic 12">
+              <a:extLst>
+                <a:ext uri="{FF2B5EF4-FFF2-40B4-BE49-F238E27FC236}">
+                  <a16:creationId xmlns:a16="http://schemas.microsoft.com/office/drawing/2014/main" id="{3B794B72-6994-4DA0-B300-6A8DD2A666BA}"/>
+                </a:ext>
+              </a:extLst>
+            </p:cNvPr>
+            <p:cNvPicPr>
+              <a:picLocks noChangeAspect="1"/>
+            </p:cNvPicPr>
+            <p:nvPr/>
+          </p:nvPicPr>
+          <p:blipFill>
+            <a:blip r:embed="rId15">
+              <a:extLst>
+                <a:ext uri="{28A0092B-C50C-407E-A947-70E740481C1C}">
+                  <a14:useLocalDpi xmlns:a14="http://schemas.microsoft.com/office/drawing/2010/main" val="0"/>
+                </a:ext>
+                <a:ext uri="{96DAC541-7B7A-43D3-8B79-37D633B846F1}">
+                  <asvg:svgBlip xmlns:asvg="http://schemas.microsoft.com/office/drawing/2016/SVG/main" r:embed="rId16"/>
+                </a:ext>
+              </a:extLst>
+            </a:blip>
+            <a:stretch>
+              <a:fillRect/>
+            </a:stretch>
+          </p:blipFill>
+          <p:spPr>
+            <a:xfrm>
+              <a:off x="7331078" y="4051542"/>
+              <a:ext cx="464413" cy="464413"/>
+            </a:xfrm>
+            <a:prstGeom prst="rect">
+              <a:avLst/>
+            </a:prstGeom>
+          </p:spPr>
+        </p:pic>
+      </p:grpSp>
+    </p:spTree>
+    <p:extLst>
+      <p:ext uri="{BB962C8B-B14F-4D97-AF65-F5344CB8AC3E}">
+        <p14:creationId xmlns:p14="http://schemas.microsoft.com/office/powerpoint/2010/main" val="718970915"/>
+      </p:ext>
+    </p:extLst>
+  </p:cSld>
+  <p:clrMapOvr>
+    <a:masterClrMapping/>
+  </p:clrMapOvr>
 </p:sld>
 </file>
 

</xml_diff>

<commit_message>
Merge lab-02 (APIM) into lab-01
</commit_message>
<xml_diff>
--- a/02-aks-advanced-configuration/slides/Advanced AKS Configuration.pptx
+++ b/02-aks-advanced-configuration/slides/Advanced AKS Configuration.pptx
@@ -12301,6 +12301,107 @@
           </p:spPr>
         </p:pic>
       </p:grpSp>
+      <p:grpSp>
+        <p:nvGrpSpPr>
+          <p:cNvPr id="24" name="Group 23">
+            <a:extLst>
+              <a:ext uri="{FF2B5EF4-FFF2-40B4-BE49-F238E27FC236}">
+                <a16:creationId xmlns:a16="http://schemas.microsoft.com/office/drawing/2014/main" id="{75B8C90B-1129-4082-A350-1F4287F64398}"/>
+              </a:ext>
+            </a:extLst>
+          </p:cNvPr>
+          <p:cNvGrpSpPr/>
+          <p:nvPr/>
+        </p:nvGrpSpPr>
+        <p:grpSpPr>
+          <a:xfrm>
+            <a:off x="4019695" y="2683222"/>
+            <a:ext cx="1726053" cy="487378"/>
+            <a:chOff x="4284452" y="2780979"/>
+            <a:chExt cx="1726053" cy="487378"/>
+          </a:xfrm>
+        </p:grpSpPr>
+        <p:pic>
+          <p:nvPicPr>
+            <p:cNvPr id="25" name="Graphic 24">
+              <a:extLst>
+                <a:ext uri="{FF2B5EF4-FFF2-40B4-BE49-F238E27FC236}">
+                  <a16:creationId xmlns:a16="http://schemas.microsoft.com/office/drawing/2014/main" id="{7130F49B-EFEF-495D-BAE5-D197B5B40A06}"/>
+                </a:ext>
+              </a:extLst>
+            </p:cNvPr>
+            <p:cNvPicPr>
+              <a:picLocks noChangeAspect="1"/>
+            </p:cNvPicPr>
+            <p:nvPr/>
+          </p:nvPicPr>
+          <p:blipFill>
+            <a:blip r:embed="rId17">
+              <a:extLst>
+                <a:ext uri="{28A0092B-C50C-407E-A947-70E740481C1C}">
+                  <a14:useLocalDpi xmlns:a14="http://schemas.microsoft.com/office/drawing/2010/main" val="0"/>
+                </a:ext>
+                <a:ext uri="{96DAC541-7B7A-43D3-8B79-37D633B846F1}">
+                  <asvg:svgBlip xmlns:asvg="http://schemas.microsoft.com/office/drawing/2016/SVG/main" r:embed="rId18"/>
+                </a:ext>
+              </a:extLst>
+            </a:blip>
+            <a:stretch>
+              <a:fillRect/>
+            </a:stretch>
+          </p:blipFill>
+          <p:spPr>
+            <a:xfrm>
+              <a:off x="4284452" y="2780979"/>
+              <a:ext cx="464415" cy="464415"/>
+            </a:xfrm>
+            <a:prstGeom prst="rect">
+              <a:avLst/>
+            </a:prstGeom>
+          </p:spPr>
+        </p:pic>
+        <p:sp>
+          <p:nvSpPr>
+            <p:cNvPr id="26" name="TextBox 25">
+              <a:extLst>
+                <a:ext uri="{FF2B5EF4-FFF2-40B4-BE49-F238E27FC236}">
+                  <a16:creationId xmlns:a16="http://schemas.microsoft.com/office/drawing/2014/main" id="{D1C790A9-DD3D-475B-9A1E-98131CC61C6B}"/>
+                </a:ext>
+              </a:extLst>
+            </p:cNvPr>
+            <p:cNvSpPr txBox="1"/>
+            <p:nvPr/>
+          </p:nvSpPr>
+          <p:spPr>
+            <a:xfrm>
+              <a:off x="4682050" y="2868247"/>
+              <a:ext cx="1328455" cy="400110"/>
+            </a:xfrm>
+            <a:prstGeom prst="rect">
+              <a:avLst/>
+            </a:prstGeom>
+            <a:noFill/>
+          </p:spPr>
+          <p:txBody>
+            <a:bodyPr wrap="square" rtlCol="0">
+              <a:spAutoFit/>
+            </a:bodyPr>
+            <a:lstStyle/>
+            <a:p>
+              <a:r>
+                <a:rPr lang="en-US" sz="1000" dirty="0"/>
+                <a:t>API Management</a:t>
+              </a:r>
+            </a:p>
+            <a:p>
+              <a:r>
+                <a:rPr lang="en-US" sz="1000" dirty="0"/>
+                <a:t>(External)</a:t>
+              </a:r>
+            </a:p>
+          </p:txBody>
+        </p:sp>
+      </p:grpSp>
     </p:spTree>
     <p:extLst>
       <p:ext uri="{BB962C8B-B14F-4D97-AF65-F5344CB8AC3E}">

</xml_diff>